<commit_message>
Prva verzija prezentacije je stavljena: resursi/management/Bubbles.pptx
</commit_message>
<xml_diff>
--- a/resursi/management/Bubbles.pptx
+++ b/resursi/management/Bubbles.pptx
@@ -15,10 +15,19 @@
     <p:sldId id="263" r:id="rId9"/>
     <p:sldId id="264" r:id="rId10"/>
     <p:sldId id="265" r:id="rId11"/>
-    <p:sldId id="266" r:id="rId12"/>
-    <p:sldId id="268" r:id="rId13"/>
-    <p:sldId id="269" r:id="rId14"/>
-    <p:sldId id="267" r:id="rId15"/>
+    <p:sldId id="270" r:id="rId12"/>
+    <p:sldId id="271" r:id="rId13"/>
+    <p:sldId id="266" r:id="rId14"/>
+    <p:sldId id="268" r:id="rId15"/>
+    <p:sldId id="269" r:id="rId16"/>
+    <p:sldId id="272" r:id="rId17"/>
+    <p:sldId id="267" r:id="rId18"/>
+    <p:sldId id="276" r:id="rId19"/>
+    <p:sldId id="273" r:id="rId20"/>
+    <p:sldId id="275" r:id="rId21"/>
+    <p:sldId id="274" r:id="rId22"/>
+    <p:sldId id="277" r:id="rId23"/>
+    <p:sldId id="278" r:id="rId24"/>
   </p:sldIdLst>
   <p:sldSz cx="12192000" cy="6858000"/>
   <p:notesSz cx="6858000" cy="9144000"/>
@@ -117,6 +126,11 @@
       </a:defRPr>
     </a:lvl9pPr>
   </p:defaultTextStyle>
+  <p:extLst>
+    <p:ext uri="{EFAFB233-063F-42B5-8137-9DF3F51BA10A}">
+      <p15:sldGuideLst xmlns:p15="http://schemas.microsoft.com/office/powerpoint/2012/main"/>
+    </p:ext>
+  </p:extLst>
 </p:presentation>
 </file>
 
@@ -842,7 +856,7 @@
           <a:p>
             <a:fld id="{117C029E-8B6A-4D9C-88CC-9C859A32E61E}" type="datetimeFigureOut">
               <a:rPr lang="hr-HR" smtClean="0"/>
-              <a:t>2.12.2015.</a:t>
+              <a:t>3.12.2015.</a:t>
             </a:fld>
             <a:endParaRPr lang="hr-HR"/>
           </a:p>
@@ -1093,7 +1107,7 @@
           <a:p>
             <a:fld id="{117C029E-8B6A-4D9C-88CC-9C859A32E61E}" type="datetimeFigureOut">
               <a:rPr lang="hr-HR" smtClean="0"/>
-              <a:t>2.12.2015.</a:t>
+              <a:t>3.12.2015.</a:t>
             </a:fld>
             <a:endParaRPr lang="hr-HR"/>
           </a:p>
@@ -1407,7 +1421,7 @@
           <a:p>
             <a:fld id="{117C029E-8B6A-4D9C-88CC-9C859A32E61E}" type="datetimeFigureOut">
               <a:rPr lang="hr-HR" smtClean="0"/>
-              <a:t>2.12.2015.</a:t>
+              <a:t>3.12.2015.</a:t>
             </a:fld>
             <a:endParaRPr lang="hr-HR"/>
           </a:p>
@@ -1748,7 +1762,7 @@
           <a:p>
             <a:fld id="{117C029E-8B6A-4D9C-88CC-9C859A32E61E}" type="datetimeFigureOut">
               <a:rPr lang="hr-HR" smtClean="0"/>
-              <a:t>2.12.2015.</a:t>
+              <a:t>3.12.2015.</a:t>
             </a:fld>
             <a:endParaRPr lang="hr-HR"/>
           </a:p>
@@ -2062,7 +2076,7 @@
           <a:p>
             <a:fld id="{117C029E-8B6A-4D9C-88CC-9C859A32E61E}" type="datetimeFigureOut">
               <a:rPr lang="hr-HR" smtClean="0"/>
-              <a:t>2.12.2015.</a:t>
+              <a:t>3.12.2015.</a:t>
             </a:fld>
             <a:endParaRPr lang="hr-HR"/>
           </a:p>
@@ -2455,7 +2469,7 @@
           <a:p>
             <a:fld id="{117C029E-8B6A-4D9C-88CC-9C859A32E61E}" type="datetimeFigureOut">
               <a:rPr lang="hr-HR" smtClean="0"/>
-              <a:t>2.12.2015.</a:t>
+              <a:t>3.12.2015.</a:t>
             </a:fld>
             <a:endParaRPr lang="hr-HR"/>
           </a:p>
@@ -2625,7 +2639,7 @@
           <a:p>
             <a:fld id="{117C029E-8B6A-4D9C-88CC-9C859A32E61E}" type="datetimeFigureOut">
               <a:rPr lang="hr-HR" smtClean="0"/>
-              <a:t>2.12.2015.</a:t>
+              <a:t>3.12.2015.</a:t>
             </a:fld>
             <a:endParaRPr lang="hr-HR"/>
           </a:p>
@@ -2805,7 +2819,7 @@
           <a:p>
             <a:fld id="{117C029E-8B6A-4D9C-88CC-9C859A32E61E}" type="datetimeFigureOut">
               <a:rPr lang="hr-HR" smtClean="0"/>
-              <a:t>2.12.2015.</a:t>
+              <a:t>3.12.2015.</a:t>
             </a:fld>
             <a:endParaRPr lang="hr-HR"/>
           </a:p>
@@ -2981,7 +2995,7 @@
           <a:p>
             <a:fld id="{117C029E-8B6A-4D9C-88CC-9C859A32E61E}" type="datetimeFigureOut">
               <a:rPr lang="hr-HR" smtClean="0"/>
-              <a:t>2.12.2015.</a:t>
+              <a:t>3.12.2015.</a:t>
             </a:fld>
             <a:endParaRPr lang="hr-HR"/>
           </a:p>
@@ -3228,7 +3242,7 @@
           <a:p>
             <a:fld id="{117C029E-8B6A-4D9C-88CC-9C859A32E61E}" type="datetimeFigureOut">
               <a:rPr lang="hr-HR" smtClean="0"/>
-              <a:t>2.12.2015.</a:t>
+              <a:t>3.12.2015.</a:t>
             </a:fld>
             <a:endParaRPr lang="hr-HR"/>
           </a:p>
@@ -3460,7 +3474,7 @@
           <a:p>
             <a:fld id="{117C029E-8B6A-4D9C-88CC-9C859A32E61E}" type="datetimeFigureOut">
               <a:rPr lang="hr-HR" smtClean="0"/>
-              <a:t>2.12.2015.</a:t>
+              <a:t>3.12.2015.</a:t>
             </a:fld>
             <a:endParaRPr lang="hr-HR"/>
           </a:p>
@@ -3834,7 +3848,7 @@
           <a:p>
             <a:fld id="{117C029E-8B6A-4D9C-88CC-9C859A32E61E}" type="datetimeFigureOut">
               <a:rPr lang="hr-HR" smtClean="0"/>
-              <a:t>2.12.2015.</a:t>
+              <a:t>3.12.2015.</a:t>
             </a:fld>
             <a:endParaRPr lang="hr-HR"/>
           </a:p>
@@ -3957,7 +3971,7 @@
           <a:p>
             <a:fld id="{117C029E-8B6A-4D9C-88CC-9C859A32E61E}" type="datetimeFigureOut">
               <a:rPr lang="hr-HR" smtClean="0"/>
-              <a:t>2.12.2015.</a:t>
+              <a:t>3.12.2015.</a:t>
             </a:fld>
             <a:endParaRPr lang="hr-HR"/>
           </a:p>
@@ -4052,7 +4066,7 @@
           <a:p>
             <a:fld id="{117C029E-8B6A-4D9C-88CC-9C859A32E61E}" type="datetimeFigureOut">
               <a:rPr lang="hr-HR" smtClean="0"/>
-              <a:t>2.12.2015.</a:t>
+              <a:t>3.12.2015.</a:t>
             </a:fld>
             <a:endParaRPr lang="hr-HR"/>
           </a:p>
@@ -4307,7 +4321,7 @@
           <a:p>
             <a:fld id="{117C029E-8B6A-4D9C-88CC-9C859A32E61E}" type="datetimeFigureOut">
               <a:rPr lang="hr-HR" smtClean="0"/>
-              <a:t>2.12.2015.</a:t>
+              <a:t>3.12.2015.</a:t>
             </a:fld>
             <a:endParaRPr lang="hr-HR"/>
           </a:p>
@@ -4570,7 +4584,7 @@
           <a:p>
             <a:fld id="{117C029E-8B6A-4D9C-88CC-9C859A32E61E}" type="datetimeFigureOut">
               <a:rPr lang="hr-HR" smtClean="0"/>
-              <a:t>2.12.2015.</a:t>
+              <a:t>3.12.2015.</a:t>
             </a:fld>
             <a:endParaRPr lang="hr-HR"/>
           </a:p>
@@ -5313,7 +5327,7 @@
           <a:p>
             <a:fld id="{117C029E-8B6A-4D9C-88CC-9C859A32E61E}" type="datetimeFigureOut">
               <a:rPr lang="hr-HR" smtClean="0"/>
-              <a:t>2.12.2015.</a:t>
+              <a:t>3.12.2015.</a:t>
             </a:fld>
             <a:endParaRPr lang="hr-HR"/>
           </a:p>
@@ -6075,62 +6089,73 @@
           <a:bodyPr/>
           <a:lstStyle/>
           <a:p>
-            <a:pPr algn="ctr"/>
-            <a:r>
-              <a:rPr lang="hr-HR" dirty="0" smtClean="0"/>
-              <a:t>Stranica profila</a:t>
-            </a:r>
-            <a:endParaRPr lang="hr-HR" dirty="0"/>
-          </a:p>
-        </p:txBody>
-      </p:sp>
-      <p:sp>
-        <p:nvSpPr>
-          <p:cNvPr id="3" name="Content Placeholder 2"/>
-          <p:cNvSpPr>
-            <a:spLocks noGrp="1"/>
-          </p:cNvSpPr>
+            <a:endParaRPr lang="hr-HR"/>
+          </a:p>
+        </p:txBody>
+      </p:sp>
+      <p:pic>
+        <p:nvPicPr>
+          <p:cNvPr id="5" name="Picture 4"/>
+          <p:cNvPicPr>
+            <a:picLocks noChangeAspect="1"/>
+          </p:cNvPicPr>
+          <p:nvPr/>
+        </p:nvPicPr>
+        <p:blipFill>
+          <a:blip r:embed="rId2">
+            <a:extLst>
+              <a:ext uri="{28A0092B-C50C-407E-A947-70E740481C1C}">
+                <a14:useLocalDpi xmlns:a14="http://schemas.microsoft.com/office/drawing/2010/main" val="0"/>
+              </a:ext>
+            </a:extLst>
+          </a:blip>
+          <a:stretch>
+            <a:fillRect/>
+          </a:stretch>
+        </p:blipFill>
+        <p:spPr>
+          <a:xfrm rot="10800000">
+            <a:off x="1187532" y="0"/>
+            <a:ext cx="9452758" cy="3391065"/>
+          </a:xfrm>
+          <a:prstGeom prst="rect">
+            <a:avLst/>
+          </a:prstGeom>
+        </p:spPr>
+      </p:pic>
+      <p:pic>
+        <p:nvPicPr>
+          <p:cNvPr id="4" name="Content Placeholder 3"/>
+          <p:cNvPicPr>
+            <a:picLocks noGrp="1" noChangeAspect="1"/>
+          </p:cNvPicPr>
           <p:nvPr>
             <p:ph idx="1"/>
           </p:nvPr>
-        </p:nvSpPr>
+        </p:nvPicPr>
+        <p:blipFill>
+          <a:blip r:embed="rId3">
+            <a:extLst>
+              <a:ext uri="{28A0092B-C50C-407E-A947-70E740481C1C}">
+                <a14:useLocalDpi xmlns:a14="http://schemas.microsoft.com/office/drawing/2010/main" val="0"/>
+              </a:ext>
+            </a:extLst>
+          </a:blip>
+          <a:stretch>
+            <a:fillRect/>
+          </a:stretch>
+        </p:blipFill>
         <p:spPr>
           <a:xfrm>
-            <a:off x="677334" y="1733266"/>
-            <a:ext cx="8596668" cy="4837373"/>
+            <a:off x="460717" y="2880426"/>
+            <a:ext cx="9265174" cy="3982567"/>
           </a:xfrm>
         </p:spPr>
-        <p:txBody>
-          <a:bodyPr>
-            <a:normAutofit/>
-          </a:bodyPr>
-          <a:lstStyle/>
-          <a:p>
-            <a:r>
-              <a:rPr lang="hr-HR" dirty="0" smtClean="0"/>
-              <a:t>nudi pristup svim informacijama o korisniku čiji se profil pregledava</a:t>
-            </a:r>
-          </a:p>
-          <a:p>
-            <a:r>
-              <a:rPr lang="hr-HR" dirty="0" smtClean="0"/>
-              <a:t>podijeljena u nekoliko pododjeljaka(</a:t>
-            </a:r>
-            <a:r>
-              <a:rPr lang="hr-HR" dirty="0" err="1" smtClean="0"/>
-              <a:t>tabovi</a:t>
-            </a:r>
-            <a:r>
-              <a:rPr lang="hr-HR" dirty="0" smtClean="0"/>
-              <a:t>):</a:t>
-            </a:r>
-          </a:p>
-        </p:txBody>
-      </p:sp>
+      </p:pic>
     </p:spTree>
     <p:extLst>
       <p:ext uri="{BB962C8B-B14F-4D97-AF65-F5344CB8AC3E}">
-        <p14:creationId xmlns:p14="http://schemas.microsoft.com/office/powerpoint/2010/main" val="2137710519"/>
+        <p14:creationId xmlns:p14="http://schemas.microsoft.com/office/powerpoint/2010/main" val="3562214564"/>
       </p:ext>
     </p:extLst>
   </p:cSld>
@@ -6166,6 +6191,30 @@
       </p:grpSpPr>
       <p:sp>
         <p:nvSpPr>
+          <p:cNvPr id="2" name="Title 1"/>
+          <p:cNvSpPr>
+            <a:spLocks noGrp="1"/>
+          </p:cNvSpPr>
+          <p:nvPr>
+            <p:ph type="title"/>
+          </p:nvPr>
+        </p:nvSpPr>
+        <p:spPr/>
+        <p:txBody>
+          <a:bodyPr/>
+          <a:lstStyle/>
+          <a:p>
+            <a:pPr algn="ctr"/>
+            <a:r>
+              <a:rPr lang="hr-HR" dirty="0" smtClean="0"/>
+              <a:t>Objavljivanje postova</a:t>
+            </a:r>
+            <a:endParaRPr lang="hr-HR" dirty="0"/>
+          </a:p>
+        </p:txBody>
+      </p:sp>
+      <p:sp>
+        <p:nvSpPr>
           <p:cNvPr id="3" name="Content Placeholder 2"/>
           <p:cNvSpPr>
             <a:spLocks noGrp="1"/>
@@ -6176,7 +6225,7 @@
         </p:nvSpPr>
         <p:spPr>
           <a:xfrm>
-            <a:off x="486266" y="236254"/>
+            <a:off x="677334" y="1270000"/>
             <a:ext cx="8596668" cy="3880773"/>
           </a:xfrm>
         </p:spPr>
@@ -6184,66 +6233,25 @@
           <a:bodyPr/>
           <a:lstStyle/>
           <a:p>
-            <a:pPr lvl="1"/>
-            <a:r>
-              <a:rPr lang="hr-HR" dirty="0" err="1"/>
-              <a:t>timeline</a:t>
-            </a:r>
-            <a:r>
-              <a:rPr lang="hr-HR" dirty="0"/>
-              <a:t> </a:t>
-            </a:r>
-            <a:r>
-              <a:rPr lang="hr-HR" dirty="0" err="1" smtClean="0"/>
-              <a:t>tab</a:t>
-            </a:r>
             <a:r>
               <a:rPr lang="hr-HR" dirty="0" smtClean="0"/>
-              <a:t>(</a:t>
-            </a:r>
-            <a:r>
-              <a:rPr lang="hr-HR" dirty="0" err="1" smtClean="0"/>
-              <a:t>bubble</a:t>
-            </a:r>
+              <a:t>koristi se vanjski, „forumski”, besplatni uređivač teksta otvorenog koda(</a:t>
+            </a:r>
+            <a:r>
+              <a:rPr lang="hr-HR" b="1" dirty="0" err="1" smtClean="0"/>
+              <a:t>SCEditor</a:t>
+            </a:r>
+            <a:r>
+              <a:rPr lang="hr-HR" b="1" dirty="0" smtClean="0"/>
+              <a:t>)</a:t>
+            </a:r>
+            <a:endParaRPr lang="hr-HR" dirty="0" smtClean="0"/>
+          </a:p>
+          <a:p>
             <a:r>
               <a:rPr lang="hr-HR" dirty="0" smtClean="0"/>
-              <a:t>)</a:t>
-            </a:r>
-            <a:endParaRPr lang="hr-HR" dirty="0"/>
-          </a:p>
-          <a:p>
-            <a:pPr lvl="2"/>
-            <a:r>
-              <a:rPr lang="hr-HR" dirty="0"/>
-              <a:t>sadrži isključivo postove:</a:t>
-            </a:r>
-          </a:p>
-          <a:p>
-            <a:pPr lvl="3"/>
-            <a:r>
-              <a:rPr lang="hr-HR" dirty="0"/>
-              <a:t>postovi sadrže tekst, multimediju(slika, video), poveznice na druge web stranice i sadržaje</a:t>
-            </a:r>
-          </a:p>
-          <a:p>
-            <a:pPr lvl="2"/>
-            <a:r>
-              <a:rPr lang="hr-HR" dirty="0"/>
-              <a:t>prikazuje postove korisnika vlasnika profila u kronološkom poretku</a:t>
-            </a:r>
-          </a:p>
-          <a:p>
-            <a:pPr lvl="2"/>
-            <a:r>
-              <a:rPr lang="hr-HR" dirty="0"/>
-              <a:t>omogućuje dodavanje, uređivanje i brisanje vlastitih postova</a:t>
-            </a:r>
-          </a:p>
-          <a:p>
-            <a:pPr lvl="2"/>
-            <a:endParaRPr lang="hr-HR" dirty="0"/>
-          </a:p>
-          <a:p>
+              <a:t>omogućuje puno različitih funkcionalnosti(dodavanje slika, videa, formatiranje teksta, itd.)</a:t>
+            </a:r>
             <a:endParaRPr lang="hr-HR" dirty="0"/>
           </a:p>
         </p:txBody>
@@ -6270,52 +6278,18 @@
         </p:blipFill>
         <p:spPr>
           <a:xfrm>
-            <a:off x="341956" y="2176640"/>
-            <a:ext cx="5057531" cy="4306047"/>
+            <a:off x="1151906" y="2600695"/>
+            <a:ext cx="8466667" cy="4156364"/>
           </a:xfrm>
           <a:prstGeom prst="rect">
             <a:avLst/>
           </a:prstGeom>
         </p:spPr>
       </p:pic>
-      <p:sp>
-        <p:nvSpPr>
-          <p:cNvPr id="5" name="TextBox 4"/>
-          <p:cNvSpPr txBox="1"/>
-          <p:nvPr/>
-        </p:nvSpPr>
-        <p:spPr>
-          <a:xfrm>
-            <a:off x="1419367" y="6482687"/>
-            <a:ext cx="4148920" cy="369332"/>
-          </a:xfrm>
-          <a:prstGeom prst="rect">
-            <a:avLst/>
-          </a:prstGeom>
-          <a:noFill/>
-        </p:spPr>
-        <p:txBody>
-          <a:bodyPr wrap="square" rtlCol="0">
-            <a:spAutoFit/>
-          </a:bodyPr>
-          <a:lstStyle/>
-          <a:p>
-            <a:r>
-              <a:rPr lang="hr-HR" dirty="0" smtClean="0"/>
-              <a:t>Dodat ćemo datum u </a:t>
-            </a:r>
-            <a:r>
-              <a:rPr lang="hr-HR" dirty="0" err="1" smtClean="0"/>
-              <a:t>content_info</a:t>
-            </a:r>
-            <a:endParaRPr lang="hr-HR" dirty="0"/>
-          </a:p>
-        </p:txBody>
-      </p:sp>
     </p:spTree>
     <p:extLst>
       <p:ext uri="{BB962C8B-B14F-4D97-AF65-F5344CB8AC3E}">
-        <p14:creationId xmlns:p14="http://schemas.microsoft.com/office/powerpoint/2010/main" val="2202654355"/>
+        <p14:creationId xmlns:p14="http://schemas.microsoft.com/office/powerpoint/2010/main" val="1018248550"/>
       </p:ext>
     </p:extLst>
   </p:cSld>
@@ -6351,6 +6325,30 @@
       </p:grpSpPr>
       <p:sp>
         <p:nvSpPr>
+          <p:cNvPr id="2" name="Title 1"/>
+          <p:cNvSpPr>
+            <a:spLocks noGrp="1"/>
+          </p:cNvSpPr>
+          <p:nvPr>
+            <p:ph type="title"/>
+          </p:nvPr>
+        </p:nvSpPr>
+        <p:spPr/>
+        <p:txBody>
+          <a:bodyPr/>
+          <a:lstStyle/>
+          <a:p>
+            <a:pPr algn="ctr"/>
+            <a:r>
+              <a:rPr lang="hr-HR" dirty="0" smtClean="0"/>
+              <a:t>Stranica profila</a:t>
+            </a:r>
+            <a:endParaRPr lang="hr-HR" dirty="0"/>
+          </a:p>
+        </p:txBody>
+      </p:sp>
+      <p:sp>
+        <p:nvSpPr>
           <p:cNvPr id="3" name="Content Placeholder 2"/>
           <p:cNvSpPr>
             <a:spLocks noGrp="1"/>
@@ -6361,107 +6359,34 @@
         </p:nvSpPr>
         <p:spPr>
           <a:xfrm>
-            <a:off x="650039" y="318141"/>
-            <a:ext cx="8596668" cy="3880773"/>
+            <a:off x="677334" y="1733266"/>
+            <a:ext cx="8596668" cy="4837373"/>
           </a:xfrm>
         </p:spPr>
         <p:txBody>
-          <a:bodyPr/>
+          <a:bodyPr>
+            <a:normAutofit/>
+          </a:bodyPr>
           <a:lstStyle/>
           <a:p>
-            <a:pPr lvl="1">
-              <a:buClr>
-                <a:srgbClr val="90C226"/>
-              </a:buClr>
-            </a:pPr>
-            <a:r>
-              <a:rPr lang="hr-HR" dirty="0" err="1">
-                <a:solidFill>
-                  <a:prstClr val="black">
-                    <a:lumMod val="75000"/>
-                    <a:lumOff val="25000"/>
-                  </a:prstClr>
-                </a:solidFill>
-              </a:rPr>
-              <a:t>gallery</a:t>
-            </a:r>
-            <a:r>
-              <a:rPr lang="hr-HR" dirty="0">
-                <a:solidFill>
-                  <a:prstClr val="black">
-                    <a:lumMod val="75000"/>
-                    <a:lumOff val="25000"/>
-                  </a:prstClr>
-                </a:solidFill>
-              </a:rPr>
-              <a:t> </a:t>
-            </a:r>
-            <a:r>
-              <a:rPr lang="hr-HR" dirty="0" err="1">
-                <a:solidFill>
-                  <a:prstClr val="black">
-                    <a:lumMod val="75000"/>
-                    <a:lumOff val="25000"/>
-                  </a:prstClr>
-                </a:solidFill>
-              </a:rPr>
-              <a:t>tab</a:t>
-            </a:r>
-            <a:endParaRPr lang="hr-HR" dirty="0">
-              <a:solidFill>
-                <a:prstClr val="black">
-                  <a:lumMod val="75000"/>
-                  <a:lumOff val="25000"/>
-                </a:prstClr>
-              </a:solidFill>
-            </a:endParaRPr>
-          </a:p>
-          <a:p>
-            <a:pPr lvl="2">
-              <a:buClr>
-                <a:srgbClr val="90C226"/>
-              </a:buClr>
-            </a:pPr>
-            <a:r>
-              <a:rPr lang="hr-HR" dirty="0">
-                <a:solidFill>
-                  <a:prstClr val="black">
-                    <a:lumMod val="75000"/>
-                    <a:lumOff val="25000"/>
-                  </a:prstClr>
-                </a:solidFill>
-              </a:rPr>
-              <a:t>sadrži isključivo slike</a:t>
-            </a:r>
-          </a:p>
-          <a:p>
-            <a:pPr lvl="2"/>
-            <a:r>
-              <a:rPr lang="hr-HR" dirty="0"/>
-              <a:t>prikazuje slike korisnika iz </a:t>
-            </a:r>
-            <a:r>
-              <a:rPr lang="hr-HR" dirty="0" err="1"/>
-              <a:t>fotoalbuma</a:t>
-            </a:r>
-            <a:r>
-              <a:rPr lang="hr-HR" dirty="0"/>
-              <a:t> u kronološkom poretku</a:t>
-            </a:r>
-          </a:p>
-          <a:p>
-            <a:pPr lvl="2"/>
             <a:r>
               <a:rPr lang="hr-HR" dirty="0" smtClean="0"/>
-              <a:t>omogućuje </a:t>
-            </a:r>
-            <a:r>
-              <a:rPr lang="hr-HR" dirty="0"/>
-              <a:t>dodavanje i brisanje vlastitih slika</a:t>
-            </a:r>
-          </a:p>
-          <a:p>
-            <a:endParaRPr lang="hr-HR" dirty="0"/>
+              <a:t>nudi pristup svim informacijama o korisniku čiji se profil pregledava</a:t>
+            </a:r>
+          </a:p>
+          <a:p>
+            <a:r>
+              <a:rPr lang="hr-HR" dirty="0" smtClean="0"/>
+              <a:t>podijeljena u nekoliko pododjeljaka(</a:t>
+            </a:r>
+            <a:r>
+              <a:rPr lang="hr-HR" dirty="0" err="1" smtClean="0"/>
+              <a:t>tabovi</a:t>
+            </a:r>
+            <a:r>
+              <a:rPr lang="hr-HR" dirty="0" smtClean="0"/>
+              <a:t>):</a:t>
+            </a:r>
           </a:p>
         </p:txBody>
       </p:sp>
@@ -6487,8 +6412,38 @@
         </p:blipFill>
         <p:spPr>
           <a:xfrm>
-            <a:off x="5658056" y="1296537"/>
-            <a:ext cx="6533944" cy="5580084"/>
+            <a:off x="0" y="2591542"/>
+            <a:ext cx="5593371" cy="4113458"/>
+          </a:xfrm>
+          <a:prstGeom prst="rect">
+            <a:avLst/>
+          </a:prstGeom>
+        </p:spPr>
+      </p:pic>
+      <p:pic>
+        <p:nvPicPr>
+          <p:cNvPr id="5" name="Picture 4"/>
+          <p:cNvPicPr>
+            <a:picLocks noChangeAspect="1"/>
+          </p:cNvPicPr>
+          <p:nvPr/>
+        </p:nvPicPr>
+        <p:blipFill>
+          <a:blip r:embed="rId3">
+            <a:extLst>
+              <a:ext uri="{28A0092B-C50C-407E-A947-70E740481C1C}">
+                <a14:useLocalDpi xmlns:a14="http://schemas.microsoft.com/office/drawing/2010/main" val="0"/>
+              </a:ext>
+            </a:extLst>
+          </a:blip>
+          <a:stretch>
+            <a:fillRect/>
+          </a:stretch>
+        </p:blipFill>
+        <p:spPr>
+          <a:xfrm>
+            <a:off x="5747657" y="2153166"/>
+            <a:ext cx="6444343" cy="4551834"/>
           </a:xfrm>
           <a:prstGeom prst="rect">
             <a:avLst/>
@@ -6498,7 +6453,7 @@
     </p:spTree>
     <p:extLst>
       <p:ext uri="{BB962C8B-B14F-4D97-AF65-F5344CB8AC3E}">
-        <p14:creationId xmlns:p14="http://schemas.microsoft.com/office/powerpoint/2010/main" val="1623769510"/>
+        <p14:creationId xmlns:p14="http://schemas.microsoft.com/office/powerpoint/2010/main" val="2137710519"/>
       </p:ext>
     </p:extLst>
   </p:cSld>
@@ -6534,23 +6489,219 @@
       </p:grpSpPr>
       <p:sp>
         <p:nvSpPr>
-          <p:cNvPr id="2" name="Title 1"/>
-          <p:cNvSpPr>
-            <a:spLocks noGrp="1"/>
-          </p:cNvSpPr>
-          <p:nvPr>
-            <p:ph type="title"/>
-          </p:nvPr>
-        </p:nvSpPr>
-        <p:spPr/>
+          <p:cNvPr id="3" name="Content Placeholder 2"/>
+          <p:cNvSpPr>
+            <a:spLocks noGrp="1"/>
+          </p:cNvSpPr>
+          <p:nvPr>
+            <p:ph idx="1"/>
+          </p:nvPr>
+        </p:nvSpPr>
+        <p:spPr>
+          <a:xfrm>
+            <a:off x="486266" y="236254"/>
+            <a:ext cx="8596668" cy="3880773"/>
+          </a:xfrm>
+        </p:spPr>
         <p:txBody>
           <a:bodyPr/>
           <a:lstStyle/>
           <a:p>
+            <a:pPr lvl="1"/>
+            <a:r>
+              <a:rPr lang="hr-HR" dirty="0" err="1"/>
+              <a:t>timeline</a:t>
+            </a:r>
+            <a:r>
+              <a:rPr lang="hr-HR" dirty="0"/>
+              <a:t> </a:t>
+            </a:r>
+            <a:r>
+              <a:rPr lang="hr-HR" dirty="0" err="1" smtClean="0"/>
+              <a:t>tab</a:t>
+            </a:r>
+            <a:r>
+              <a:rPr lang="hr-HR" dirty="0" smtClean="0"/>
+              <a:t>(</a:t>
+            </a:r>
+            <a:r>
+              <a:rPr lang="hr-HR" dirty="0" err="1" smtClean="0"/>
+              <a:t>bubble</a:t>
+            </a:r>
+            <a:r>
+              <a:rPr lang="hr-HR" dirty="0" smtClean="0"/>
+              <a:t>)</a:t>
+            </a:r>
             <a:endParaRPr lang="hr-HR" dirty="0"/>
           </a:p>
-        </p:txBody>
-      </p:sp>
+          <a:p>
+            <a:pPr lvl="2"/>
+            <a:r>
+              <a:rPr lang="hr-HR" dirty="0"/>
+              <a:t>sadrži isključivo postove:</a:t>
+            </a:r>
+          </a:p>
+          <a:p>
+            <a:pPr lvl="3"/>
+            <a:r>
+              <a:rPr lang="hr-HR" dirty="0"/>
+              <a:t>postovi sadrže tekst, multimediju(slika, video), poveznice na druge web stranice i sadržaje</a:t>
+            </a:r>
+          </a:p>
+          <a:p>
+            <a:pPr lvl="2"/>
+            <a:r>
+              <a:rPr lang="hr-HR" dirty="0"/>
+              <a:t>prikazuje postove korisnika vlasnika profila u kronološkom poretku</a:t>
+            </a:r>
+          </a:p>
+          <a:p>
+            <a:pPr lvl="2"/>
+            <a:r>
+              <a:rPr lang="hr-HR" dirty="0"/>
+              <a:t>omogućuje dodavanje, uređivanje i brisanje vlastitih postova</a:t>
+            </a:r>
+          </a:p>
+          <a:p>
+            <a:pPr lvl="2"/>
+            <a:endParaRPr lang="hr-HR" dirty="0"/>
+          </a:p>
+          <a:p>
+            <a:endParaRPr lang="hr-HR" dirty="0"/>
+          </a:p>
+        </p:txBody>
+      </p:sp>
+      <p:pic>
+        <p:nvPicPr>
+          <p:cNvPr id="4" name="Picture 3"/>
+          <p:cNvPicPr>
+            <a:picLocks noChangeAspect="1"/>
+          </p:cNvPicPr>
+          <p:nvPr/>
+        </p:nvPicPr>
+        <p:blipFill>
+          <a:blip r:embed="rId2">
+            <a:extLst>
+              <a:ext uri="{28A0092B-C50C-407E-A947-70E740481C1C}">
+                <a14:useLocalDpi xmlns:a14="http://schemas.microsoft.com/office/drawing/2010/main" val="0"/>
+              </a:ext>
+            </a:extLst>
+          </a:blip>
+          <a:stretch>
+            <a:fillRect/>
+          </a:stretch>
+        </p:blipFill>
+        <p:spPr>
+          <a:xfrm>
+            <a:off x="151951" y="2176640"/>
+            <a:ext cx="5057531" cy="4306047"/>
+          </a:xfrm>
+          <a:prstGeom prst="rect">
+            <a:avLst/>
+          </a:prstGeom>
+        </p:spPr>
+      </p:pic>
+      <p:sp>
+        <p:nvSpPr>
+          <p:cNvPr id="5" name="TextBox 4"/>
+          <p:cNvSpPr txBox="1"/>
+          <p:nvPr/>
+        </p:nvSpPr>
+        <p:spPr>
+          <a:xfrm>
+            <a:off x="1419367" y="6482687"/>
+            <a:ext cx="4148920" cy="369332"/>
+          </a:xfrm>
+          <a:prstGeom prst="rect">
+            <a:avLst/>
+          </a:prstGeom>
+          <a:noFill/>
+        </p:spPr>
+        <p:txBody>
+          <a:bodyPr wrap="square" rtlCol="0">
+            <a:spAutoFit/>
+          </a:bodyPr>
+          <a:lstStyle/>
+          <a:p>
+            <a:r>
+              <a:rPr lang="hr-HR" dirty="0" smtClean="0"/>
+              <a:t>Dodat ćemo datum u </a:t>
+            </a:r>
+            <a:r>
+              <a:rPr lang="hr-HR" dirty="0" err="1" smtClean="0"/>
+              <a:t>content_info</a:t>
+            </a:r>
+            <a:endParaRPr lang="hr-HR" dirty="0"/>
+          </a:p>
+        </p:txBody>
+      </p:sp>
+      <p:pic>
+        <p:nvPicPr>
+          <p:cNvPr id="2" name="Picture 1"/>
+          <p:cNvPicPr>
+            <a:picLocks noChangeAspect="1"/>
+          </p:cNvPicPr>
+          <p:nvPr/>
+        </p:nvPicPr>
+        <p:blipFill>
+          <a:blip r:embed="rId3">
+            <a:extLst>
+              <a:ext uri="{28A0092B-C50C-407E-A947-70E740481C1C}">
+                <a14:useLocalDpi xmlns:a14="http://schemas.microsoft.com/office/drawing/2010/main" val="0"/>
+              </a:ext>
+            </a:extLst>
+          </a:blip>
+          <a:stretch>
+            <a:fillRect/>
+          </a:stretch>
+        </p:blipFill>
+        <p:spPr>
+          <a:xfrm>
+            <a:off x="5209482" y="2176640"/>
+            <a:ext cx="6982518" cy="4705350"/>
+          </a:xfrm>
+          <a:prstGeom prst="rect">
+            <a:avLst/>
+          </a:prstGeom>
+        </p:spPr>
+      </p:pic>
+    </p:spTree>
+    <p:extLst>
+      <p:ext uri="{BB962C8B-B14F-4D97-AF65-F5344CB8AC3E}">
+        <p14:creationId xmlns:p14="http://schemas.microsoft.com/office/powerpoint/2010/main" val="2202654355"/>
+      </p:ext>
+    </p:extLst>
+  </p:cSld>
+  <p:clrMapOvr>
+    <a:masterClrMapping/>
+  </p:clrMapOvr>
+  <p:timing>
+    <p:tnLst>
+      <p:par>
+        <p:cTn id="1" dur="indefinite" restart="never" nodeType="tmRoot"/>
+      </p:par>
+    </p:tnLst>
+  </p:timing>
+</p:sld>
+</file>
+
+<file path=ppt/slides/slide15.xml><?xml version="1.0" encoding="utf-8"?>
+<p:sld xmlns:a="http://schemas.openxmlformats.org/drawingml/2006/main" xmlns:r="http://schemas.openxmlformats.org/officeDocument/2006/relationships" xmlns:p="http://schemas.openxmlformats.org/presentationml/2006/main">
+  <p:cSld>
+    <p:spTree>
+      <p:nvGrpSpPr>
+        <p:cNvPr id="1" name=""/>
+        <p:cNvGrpSpPr/>
+        <p:nvPr/>
+      </p:nvGrpSpPr>
+      <p:grpSpPr>
+        <a:xfrm>
+          <a:off x="0" y="0"/>
+          <a:ext cx="0" cy="0"/>
+          <a:chOff x="0" y="0"/>
+          <a:chExt cx="0" cy="0"/>
+        </a:xfrm>
+      </p:grpSpPr>
       <p:sp>
         <p:nvSpPr>
           <p:cNvPr id="3" name="Content Placeholder 2"/>
@@ -6561,10 +6712,346 @@
             <p:ph idx="1"/>
           </p:nvPr>
         </p:nvSpPr>
+        <p:spPr>
+          <a:xfrm>
+            <a:off x="650039" y="318141"/>
+            <a:ext cx="8596668" cy="3880773"/>
+          </a:xfrm>
+        </p:spPr>
+        <p:txBody>
+          <a:bodyPr/>
+          <a:lstStyle/>
+          <a:p>
+            <a:pPr lvl="1">
+              <a:buClr>
+                <a:srgbClr val="90C226"/>
+              </a:buClr>
+            </a:pPr>
+            <a:r>
+              <a:rPr lang="hr-HR" dirty="0" err="1">
+                <a:solidFill>
+                  <a:prstClr val="black">
+                    <a:lumMod val="75000"/>
+                    <a:lumOff val="25000"/>
+                  </a:prstClr>
+                </a:solidFill>
+              </a:rPr>
+              <a:t>gallery</a:t>
+            </a:r>
+            <a:r>
+              <a:rPr lang="hr-HR" dirty="0">
+                <a:solidFill>
+                  <a:prstClr val="black">
+                    <a:lumMod val="75000"/>
+                    <a:lumOff val="25000"/>
+                  </a:prstClr>
+                </a:solidFill>
+              </a:rPr>
+              <a:t> </a:t>
+            </a:r>
+            <a:r>
+              <a:rPr lang="hr-HR" dirty="0" err="1" smtClean="0">
+                <a:solidFill>
+                  <a:prstClr val="black">
+                    <a:lumMod val="75000"/>
+                    <a:lumOff val="25000"/>
+                  </a:prstClr>
+                </a:solidFill>
+              </a:rPr>
+              <a:t>tab</a:t>
+            </a:r>
+            <a:r>
+              <a:rPr lang="hr-HR" dirty="0" smtClean="0">
+                <a:solidFill>
+                  <a:prstClr val="black">
+                    <a:lumMod val="75000"/>
+                    <a:lumOff val="25000"/>
+                  </a:prstClr>
+                </a:solidFill>
+              </a:rPr>
+              <a:t>(</a:t>
+            </a:r>
+            <a:r>
+              <a:rPr lang="hr-HR" dirty="0" err="1" smtClean="0">
+                <a:solidFill>
+                  <a:prstClr val="black">
+                    <a:lumMod val="75000"/>
+                    <a:lumOff val="25000"/>
+                  </a:prstClr>
+                </a:solidFill>
+              </a:rPr>
+              <a:t>bubble</a:t>
+            </a:r>
+            <a:r>
+              <a:rPr lang="hr-HR" dirty="0" smtClean="0">
+                <a:solidFill>
+                  <a:prstClr val="black">
+                    <a:lumMod val="75000"/>
+                    <a:lumOff val="25000"/>
+                  </a:prstClr>
+                </a:solidFill>
+              </a:rPr>
+              <a:t>)</a:t>
+            </a:r>
+            <a:endParaRPr lang="hr-HR" dirty="0">
+              <a:solidFill>
+                <a:prstClr val="black">
+                  <a:lumMod val="75000"/>
+                  <a:lumOff val="25000"/>
+                </a:prstClr>
+              </a:solidFill>
+            </a:endParaRPr>
+          </a:p>
+          <a:p>
+            <a:pPr lvl="2">
+              <a:buClr>
+                <a:srgbClr val="90C226"/>
+              </a:buClr>
+            </a:pPr>
+            <a:r>
+              <a:rPr lang="hr-HR" dirty="0">
+                <a:solidFill>
+                  <a:prstClr val="black">
+                    <a:lumMod val="75000"/>
+                    <a:lumOff val="25000"/>
+                  </a:prstClr>
+                </a:solidFill>
+              </a:rPr>
+              <a:t>sadrži isključivo slike</a:t>
+            </a:r>
+          </a:p>
+          <a:p>
+            <a:pPr lvl="2"/>
+            <a:r>
+              <a:rPr lang="hr-HR" dirty="0"/>
+              <a:t>prikazuje slike korisnika iz </a:t>
+            </a:r>
+            <a:r>
+              <a:rPr lang="hr-HR" dirty="0" err="1"/>
+              <a:t>fotoalbuma</a:t>
+            </a:r>
+            <a:r>
+              <a:rPr lang="hr-HR" dirty="0"/>
+              <a:t> u kronološkom poretku</a:t>
+            </a:r>
+          </a:p>
+          <a:p>
+            <a:pPr lvl="2"/>
+            <a:r>
+              <a:rPr lang="hr-HR" dirty="0" smtClean="0"/>
+              <a:t>omogućuje </a:t>
+            </a:r>
+            <a:r>
+              <a:rPr lang="hr-HR" dirty="0"/>
+              <a:t>dodavanje i brisanje vlastitih slika</a:t>
+            </a:r>
+          </a:p>
+          <a:p>
+            <a:endParaRPr lang="hr-HR" dirty="0"/>
+          </a:p>
+        </p:txBody>
+      </p:sp>
+      <p:pic>
+        <p:nvPicPr>
+          <p:cNvPr id="4" name="Picture 3"/>
+          <p:cNvPicPr>
+            <a:picLocks noChangeAspect="1"/>
+          </p:cNvPicPr>
+          <p:nvPr/>
+        </p:nvPicPr>
+        <p:blipFill>
+          <a:blip r:embed="rId2">
+            <a:extLst>
+              <a:ext uri="{28A0092B-C50C-407E-A947-70E740481C1C}">
+                <a14:useLocalDpi xmlns:a14="http://schemas.microsoft.com/office/drawing/2010/main" val="0"/>
+              </a:ext>
+            </a:extLst>
+          </a:blip>
+          <a:stretch>
+            <a:fillRect/>
+          </a:stretch>
+        </p:blipFill>
+        <p:spPr>
+          <a:xfrm>
+            <a:off x="5658056" y="1277916"/>
+            <a:ext cx="6533944" cy="5580084"/>
+          </a:xfrm>
+          <a:prstGeom prst="rect">
+            <a:avLst/>
+          </a:prstGeom>
+        </p:spPr>
+      </p:pic>
+      <p:pic>
+        <p:nvPicPr>
+          <p:cNvPr id="2" name="Picture 1"/>
+          <p:cNvPicPr>
+            <a:picLocks noChangeAspect="1"/>
+          </p:cNvPicPr>
+          <p:nvPr/>
+        </p:nvPicPr>
+        <p:blipFill>
+          <a:blip r:embed="rId3">
+            <a:extLst>
+              <a:ext uri="{28A0092B-C50C-407E-A947-70E740481C1C}">
+                <a14:useLocalDpi xmlns:a14="http://schemas.microsoft.com/office/drawing/2010/main" val="0"/>
+              </a:ext>
+            </a:extLst>
+          </a:blip>
+          <a:stretch>
+            <a:fillRect/>
+          </a:stretch>
+        </p:blipFill>
+        <p:spPr>
+          <a:xfrm>
+            <a:off x="0" y="1971956"/>
+            <a:ext cx="5913912" cy="4453915"/>
+          </a:xfrm>
+          <a:prstGeom prst="rect">
+            <a:avLst/>
+          </a:prstGeom>
+        </p:spPr>
+      </p:pic>
+    </p:spTree>
+    <p:extLst>
+      <p:ext uri="{BB962C8B-B14F-4D97-AF65-F5344CB8AC3E}">
+        <p14:creationId xmlns:p14="http://schemas.microsoft.com/office/powerpoint/2010/main" val="1623769510"/>
+      </p:ext>
+    </p:extLst>
+  </p:cSld>
+  <p:clrMapOvr>
+    <a:masterClrMapping/>
+  </p:clrMapOvr>
+  <p:timing>
+    <p:tnLst>
+      <p:par>
+        <p:cTn id="1" dur="indefinite" restart="never" nodeType="tmRoot"/>
+      </p:par>
+    </p:tnLst>
+  </p:timing>
+</p:sld>
+</file>
+
+<file path=ppt/slides/slide16.xml><?xml version="1.0" encoding="utf-8"?>
+<p:sld xmlns:a="http://schemas.openxmlformats.org/drawingml/2006/main" xmlns:r="http://schemas.openxmlformats.org/officeDocument/2006/relationships" xmlns:p="http://schemas.openxmlformats.org/presentationml/2006/main">
+  <p:cSld>
+    <p:spTree>
+      <p:nvGrpSpPr>
+        <p:cNvPr id="1" name=""/>
+        <p:cNvGrpSpPr/>
+        <p:nvPr/>
+      </p:nvGrpSpPr>
+      <p:grpSpPr>
+        <a:xfrm>
+          <a:off x="0" y="0"/>
+          <a:ext cx="0" cy="0"/>
+          <a:chOff x="0" y="0"/>
+          <a:chExt cx="0" cy="0"/>
+        </a:xfrm>
+      </p:grpSpPr>
+      <p:sp>
+        <p:nvSpPr>
+          <p:cNvPr id="2" name="Title 1"/>
+          <p:cNvSpPr>
+            <a:spLocks noGrp="1"/>
+          </p:cNvSpPr>
+          <p:nvPr>
+            <p:ph type="title"/>
+          </p:nvPr>
+        </p:nvSpPr>
         <p:spPr/>
         <p:txBody>
+          <a:bodyPr/>
+          <a:lstStyle/>
+          <a:p>
+            <a:endParaRPr lang="hr-HR"/>
+          </a:p>
+        </p:txBody>
+      </p:sp>
+      <p:pic>
+        <p:nvPicPr>
+          <p:cNvPr id="4" name="Content Placeholder 3"/>
+          <p:cNvPicPr>
+            <a:picLocks noGrp="1" noChangeAspect="1"/>
+          </p:cNvPicPr>
+          <p:nvPr>
+            <p:ph idx="1"/>
+          </p:nvPr>
+        </p:nvPicPr>
+        <p:blipFill>
+          <a:blip r:embed="rId2">
+            <a:extLst>
+              <a:ext uri="{28A0092B-C50C-407E-A947-70E740481C1C}">
+                <a14:useLocalDpi xmlns:a14="http://schemas.microsoft.com/office/drawing/2010/main" val="0"/>
+              </a:ext>
+            </a:extLst>
+          </a:blip>
+          <a:stretch>
+            <a:fillRect/>
+          </a:stretch>
+        </p:blipFill>
+        <p:spPr>
+          <a:xfrm>
+            <a:off x="1661273" y="351070"/>
+            <a:ext cx="8515880" cy="6262721"/>
+          </a:xfrm>
+        </p:spPr>
+      </p:pic>
+    </p:spTree>
+    <p:extLst>
+      <p:ext uri="{BB962C8B-B14F-4D97-AF65-F5344CB8AC3E}">
+        <p14:creationId xmlns:p14="http://schemas.microsoft.com/office/powerpoint/2010/main" val="994434409"/>
+      </p:ext>
+    </p:extLst>
+  </p:cSld>
+  <p:clrMapOvr>
+    <a:masterClrMapping/>
+  </p:clrMapOvr>
+  <p:timing>
+    <p:tnLst>
+      <p:par>
+        <p:cTn id="1" dur="indefinite" restart="never" nodeType="tmRoot"/>
+      </p:par>
+    </p:tnLst>
+  </p:timing>
+</p:sld>
+</file>
+
+<file path=ppt/slides/slide17.xml><?xml version="1.0" encoding="utf-8"?>
+<p:sld xmlns:a="http://schemas.openxmlformats.org/drawingml/2006/main" xmlns:r="http://schemas.openxmlformats.org/officeDocument/2006/relationships" xmlns:p="http://schemas.openxmlformats.org/presentationml/2006/main">
+  <p:cSld>
+    <p:spTree>
+      <p:nvGrpSpPr>
+        <p:cNvPr id="1" name=""/>
+        <p:cNvGrpSpPr/>
+        <p:nvPr/>
+      </p:nvGrpSpPr>
+      <p:grpSpPr>
+        <a:xfrm>
+          <a:off x="0" y="0"/>
+          <a:ext cx="0" cy="0"/>
+          <a:chOff x="0" y="0"/>
+          <a:chExt cx="0" cy="0"/>
+        </a:xfrm>
+      </p:grpSpPr>
+      <p:sp>
+        <p:nvSpPr>
+          <p:cNvPr id="3" name="Content Placeholder 2"/>
+          <p:cNvSpPr>
+            <a:spLocks noGrp="1"/>
+          </p:cNvSpPr>
+          <p:nvPr>
+            <p:ph idx="1"/>
+          </p:nvPr>
+        </p:nvSpPr>
+        <p:spPr>
+          <a:xfrm>
+            <a:off x="653584" y="604922"/>
+            <a:ext cx="8596668" cy="3880773"/>
+          </a:xfrm>
+        </p:spPr>
+        <p:txBody>
           <a:bodyPr>
-            <a:normAutofit lnSpcReduction="10000"/>
+            <a:normAutofit/>
           </a:bodyPr>
           <a:lstStyle/>
           <a:p>
@@ -6649,112 +7136,6 @@
             </a:endParaRPr>
           </a:p>
           <a:p>
-            <a:pPr lvl="1">
-              <a:buClr>
-                <a:srgbClr val="90C226"/>
-              </a:buClr>
-            </a:pPr>
-            <a:r>
-              <a:rPr lang="hr-HR" dirty="0" smtClean="0">
-                <a:solidFill>
-                  <a:prstClr val="black">
-                    <a:lumMod val="75000"/>
-                    <a:lumOff val="25000"/>
-                  </a:prstClr>
-                </a:solidFill>
-              </a:rPr>
-              <a:t>profile </a:t>
-            </a:r>
-            <a:r>
-              <a:rPr lang="hr-HR" dirty="0">
-                <a:solidFill>
-                  <a:prstClr val="black">
-                    <a:lumMod val="75000"/>
-                    <a:lumOff val="25000"/>
-                  </a:prstClr>
-                </a:solidFill>
-              </a:rPr>
-              <a:t>info </a:t>
-            </a:r>
-            <a:r>
-              <a:rPr lang="hr-HR" dirty="0" err="1" smtClean="0">
-                <a:solidFill>
-                  <a:prstClr val="black">
-                    <a:lumMod val="75000"/>
-                    <a:lumOff val="25000"/>
-                  </a:prstClr>
-                </a:solidFill>
-              </a:rPr>
-              <a:t>tab</a:t>
-            </a:r>
-            <a:endParaRPr lang="hr-HR" dirty="0" smtClean="0">
-              <a:solidFill>
-                <a:prstClr val="black">
-                  <a:lumMod val="75000"/>
-                  <a:lumOff val="25000"/>
-                </a:prstClr>
-              </a:solidFill>
-            </a:endParaRPr>
-          </a:p>
-          <a:p>
-            <a:pPr lvl="2">
-              <a:buClr>
-                <a:srgbClr val="90C226"/>
-              </a:buClr>
-            </a:pPr>
-            <a:r>
-              <a:rPr lang="hr-HR" dirty="0" smtClean="0">
-                <a:solidFill>
-                  <a:prstClr val="black">
-                    <a:lumMod val="75000"/>
-                    <a:lumOff val="25000"/>
-                  </a:prstClr>
-                </a:solidFill>
-              </a:rPr>
-              <a:t>prikazuje sve informacije o profilu(osobni podaci korisnika)</a:t>
-            </a:r>
-          </a:p>
-          <a:p>
-            <a:pPr lvl="2">
-              <a:buClr>
-                <a:srgbClr val="90C226"/>
-              </a:buClr>
-            </a:pPr>
-            <a:r>
-              <a:rPr lang="hr-HR" dirty="0" smtClean="0">
-                <a:solidFill>
-                  <a:prstClr val="black">
-                    <a:lumMod val="75000"/>
-                    <a:lumOff val="25000"/>
-                  </a:prstClr>
-                </a:solidFill>
-              </a:rPr>
-              <a:t>omogućuje uređivanje podataka u obliku web obrasca(HTML </a:t>
-            </a:r>
-            <a:r>
-              <a:rPr lang="hr-HR" dirty="0" err="1" smtClean="0">
-                <a:solidFill>
-                  <a:prstClr val="black">
-                    <a:lumMod val="75000"/>
-                    <a:lumOff val="25000"/>
-                  </a:prstClr>
-                </a:solidFill>
-              </a:rPr>
-              <a:t>form</a:t>
-            </a:r>
-            <a:r>
-              <a:rPr lang="hr-HR" dirty="0" smtClean="0">
-                <a:solidFill>
-                  <a:prstClr val="black">
-                    <a:lumMod val="75000"/>
-                    <a:lumOff val="25000"/>
-                  </a:prstClr>
-                </a:solidFill>
-              </a:rPr>
-              <a:t>) </a:t>
-            </a:r>
-          </a:p>
-          <a:p>
             <a:pPr lvl="2">
               <a:buClr>
                 <a:srgbClr val="90C226"/>
@@ -6770,13 +7151,267 @@
             </a:endParaRPr>
           </a:p>
           <a:p>
+            <a:endParaRPr lang="hr-HR" dirty="0"/>
+          </a:p>
+        </p:txBody>
+      </p:sp>
+      <p:pic>
+        <p:nvPicPr>
+          <p:cNvPr id="4" name="Picture 3"/>
+          <p:cNvPicPr>
+            <a:picLocks noChangeAspect="1"/>
+          </p:cNvPicPr>
+          <p:nvPr/>
+        </p:nvPicPr>
+        <p:blipFill>
+          <a:blip r:embed="rId2">
+            <a:extLst>
+              <a:ext uri="{28A0092B-C50C-407E-A947-70E740481C1C}">
+                <a14:useLocalDpi xmlns:a14="http://schemas.microsoft.com/office/drawing/2010/main" val="0"/>
+              </a:ext>
+            </a:extLst>
+          </a:blip>
+          <a:stretch>
+            <a:fillRect/>
+          </a:stretch>
+        </p:blipFill>
+        <p:spPr>
+          <a:xfrm rot="10800000">
+            <a:off x="2034545" y="1506700"/>
+            <a:ext cx="7639792" cy="5260315"/>
+          </a:xfrm>
+          <a:prstGeom prst="rect">
+            <a:avLst/>
+          </a:prstGeom>
+        </p:spPr>
+      </p:pic>
+    </p:spTree>
+    <p:extLst>
+      <p:ext uri="{BB962C8B-B14F-4D97-AF65-F5344CB8AC3E}">
+        <p14:creationId xmlns:p14="http://schemas.microsoft.com/office/powerpoint/2010/main" val="2793625219"/>
+      </p:ext>
+    </p:extLst>
+  </p:cSld>
+  <p:clrMapOvr>
+    <a:masterClrMapping/>
+  </p:clrMapOvr>
+  <p:timing>
+    <p:tnLst>
+      <p:par>
+        <p:cTn id="1" dur="indefinite" restart="never" nodeType="tmRoot"/>
+      </p:par>
+    </p:tnLst>
+  </p:timing>
+</p:sld>
+</file>
+
+<file path=ppt/slides/slide18.xml><?xml version="1.0" encoding="utf-8"?>
+<p:sld xmlns:a="http://schemas.openxmlformats.org/drawingml/2006/main" xmlns:r="http://schemas.openxmlformats.org/officeDocument/2006/relationships" xmlns:p="http://schemas.openxmlformats.org/presentationml/2006/main">
+  <p:cSld>
+    <p:spTree>
+      <p:nvGrpSpPr>
+        <p:cNvPr id="1" name=""/>
+        <p:cNvGrpSpPr/>
+        <p:nvPr/>
+      </p:nvGrpSpPr>
+      <p:grpSpPr>
+        <a:xfrm>
+          <a:off x="0" y="0"/>
+          <a:ext cx="0" cy="0"/>
+          <a:chOff x="0" y="0"/>
+          <a:chExt cx="0" cy="0"/>
+        </a:xfrm>
+      </p:grpSpPr>
+      <p:sp>
+        <p:nvSpPr>
+          <p:cNvPr id="2" name="Title 1"/>
+          <p:cNvSpPr>
+            <a:spLocks noGrp="1"/>
+          </p:cNvSpPr>
+          <p:nvPr>
+            <p:ph type="title"/>
+          </p:nvPr>
+        </p:nvSpPr>
+        <p:spPr/>
+        <p:txBody>
+          <a:bodyPr/>
+          <a:lstStyle/>
+          <a:p>
+            <a:pPr algn="ctr"/>
+            <a:r>
+              <a:rPr lang="hr-HR" dirty="0" err="1" smtClean="0"/>
+              <a:t>Bubble</a:t>
+            </a:r>
+            <a:endParaRPr lang="hr-HR" dirty="0"/>
+          </a:p>
+        </p:txBody>
+      </p:sp>
+      <p:sp>
+        <p:nvSpPr>
+          <p:cNvPr id="3" name="Content Placeholder 2"/>
+          <p:cNvSpPr>
+            <a:spLocks noGrp="1"/>
+          </p:cNvSpPr>
+          <p:nvPr>
+            <p:ph idx="1"/>
+          </p:nvPr>
+        </p:nvSpPr>
+        <p:spPr>
+          <a:xfrm>
+            <a:off x="677334" y="1270000"/>
+            <a:ext cx="8596668" cy="3880773"/>
+          </a:xfrm>
+        </p:spPr>
+        <p:txBody>
+          <a:bodyPr/>
+          <a:lstStyle/>
+          <a:p>
+            <a:r>
+              <a:rPr lang="hr-HR" dirty="0" err="1" smtClean="0"/>
+              <a:t>bubble</a:t>
+            </a:r>
+            <a:r>
+              <a:rPr lang="hr-HR" dirty="0" smtClean="0"/>
+              <a:t> je kolekcija objava(post) i multimedije(slika, video), koja ima neku tematiku(npr., putovanje, </a:t>
+            </a:r>
+            <a:r>
+              <a:rPr lang="hr-HR" dirty="0" err="1" smtClean="0"/>
+              <a:t>timeline</a:t>
+            </a:r>
+            <a:r>
+              <a:rPr lang="hr-HR" dirty="0" smtClean="0"/>
+              <a:t>, galerija)</a:t>
+            </a:r>
+          </a:p>
+          <a:p>
+            <a:endParaRPr lang="hr-HR" dirty="0" smtClean="0"/>
+          </a:p>
+        </p:txBody>
+      </p:sp>
+      <p:pic>
+        <p:nvPicPr>
+          <p:cNvPr id="4" name="Picture 3"/>
+          <p:cNvPicPr>
+            <a:picLocks noChangeAspect="1"/>
+          </p:cNvPicPr>
+          <p:nvPr/>
+        </p:nvPicPr>
+        <p:blipFill>
+          <a:blip r:embed="rId2">
+            <a:extLst>
+              <a:ext uri="{28A0092B-C50C-407E-A947-70E740481C1C}">
+                <a14:useLocalDpi xmlns:a14="http://schemas.microsoft.com/office/drawing/2010/main" val="0"/>
+              </a:ext>
+            </a:extLst>
+          </a:blip>
+          <a:stretch>
+            <a:fillRect/>
+          </a:stretch>
+        </p:blipFill>
+        <p:spPr>
+          <a:xfrm>
+            <a:off x="5668684" y="1930400"/>
+            <a:ext cx="6833170" cy="5060332"/>
+          </a:xfrm>
+          <a:prstGeom prst="rect">
+            <a:avLst/>
+          </a:prstGeom>
+        </p:spPr>
+      </p:pic>
+      <p:pic>
+        <p:nvPicPr>
+          <p:cNvPr id="5" name="Picture 4"/>
+          <p:cNvPicPr>
+            <a:picLocks noChangeAspect="1"/>
+          </p:cNvPicPr>
+          <p:nvPr/>
+        </p:nvPicPr>
+        <p:blipFill>
+          <a:blip r:embed="rId3">
+            <a:extLst>
+              <a:ext uri="{28A0092B-C50C-407E-A947-70E740481C1C}">
+                <a14:useLocalDpi xmlns:a14="http://schemas.microsoft.com/office/drawing/2010/main" val="0"/>
+              </a:ext>
+            </a:extLst>
+          </a:blip>
+          <a:stretch>
+            <a:fillRect/>
+          </a:stretch>
+        </p:blipFill>
+        <p:spPr>
+          <a:xfrm>
+            <a:off x="0" y="1930400"/>
+            <a:ext cx="5964498" cy="4879801"/>
+          </a:xfrm>
+          <a:prstGeom prst="rect">
+            <a:avLst/>
+          </a:prstGeom>
+        </p:spPr>
+      </p:pic>
+    </p:spTree>
+    <p:extLst>
+      <p:ext uri="{BB962C8B-B14F-4D97-AF65-F5344CB8AC3E}">
+        <p14:creationId xmlns:p14="http://schemas.microsoft.com/office/powerpoint/2010/main" val="3401109583"/>
+      </p:ext>
+    </p:extLst>
+  </p:cSld>
+  <p:clrMapOvr>
+    <a:masterClrMapping/>
+  </p:clrMapOvr>
+  <p:timing>
+    <p:tnLst>
+      <p:par>
+        <p:cTn id="1" dur="indefinite" restart="never" nodeType="tmRoot"/>
+      </p:par>
+    </p:tnLst>
+  </p:timing>
+</p:sld>
+</file>
+
+<file path=ppt/slides/slide19.xml><?xml version="1.0" encoding="utf-8"?>
+<p:sld xmlns:a="http://schemas.openxmlformats.org/drawingml/2006/main" xmlns:r="http://schemas.openxmlformats.org/officeDocument/2006/relationships" xmlns:p="http://schemas.openxmlformats.org/presentationml/2006/main">
+  <p:cSld>
+    <p:spTree>
+      <p:nvGrpSpPr>
+        <p:cNvPr id="1" name=""/>
+        <p:cNvGrpSpPr/>
+        <p:nvPr/>
+      </p:nvGrpSpPr>
+      <p:grpSpPr>
+        <a:xfrm>
+          <a:off x="0" y="0"/>
+          <a:ext cx="0" cy="0"/>
+          <a:chOff x="0" y="0"/>
+          <a:chExt cx="0" cy="0"/>
+        </a:xfrm>
+      </p:grpSpPr>
+      <p:sp>
+        <p:nvSpPr>
+          <p:cNvPr id="3" name="Content Placeholder 2"/>
+          <p:cNvSpPr>
+            <a:spLocks noGrp="1"/>
+          </p:cNvSpPr>
+          <p:nvPr>
+            <p:ph idx="1"/>
+          </p:nvPr>
+        </p:nvSpPr>
+        <p:spPr>
+          <a:xfrm>
+            <a:off x="736710" y="640548"/>
+            <a:ext cx="8596668" cy="3880773"/>
+          </a:xfrm>
+        </p:spPr>
+        <p:txBody>
+          <a:bodyPr/>
+          <a:lstStyle/>
+          <a:p>
             <a:pPr lvl="1">
               <a:buClr>
                 <a:srgbClr val="90C226"/>
               </a:buClr>
             </a:pPr>
             <a:r>
-              <a:rPr lang="hr-HR" dirty="0" err="1">
+              <a:rPr lang="hr-HR" dirty="0">
                 <a:solidFill>
                   <a:prstClr val="black">
                     <a:lumMod val="75000"/>
@@ -6784,10 +7419,10 @@
                   </a:prstClr>
                 </a:solidFill>
               </a:rPr>
-              <a:t>contacts</a:t>
-            </a:r>
-            <a:r>
-              <a:rPr lang="hr-HR" dirty="0">
+              <a:t>profile info </a:t>
+            </a:r>
+            <a:r>
+              <a:rPr lang="hr-HR" dirty="0" err="1">
                 <a:solidFill>
                   <a:prstClr val="black">
                     <a:lumMod val="75000"/>
@@ -6795,109 +7430,7 @@
                   </a:prstClr>
                 </a:solidFill>
               </a:rPr>
-              <a:t> </a:t>
-            </a:r>
-            <a:r>
-              <a:rPr lang="hr-HR" dirty="0" err="1" smtClean="0">
-                <a:solidFill>
-                  <a:prstClr val="black">
-                    <a:lumMod val="75000"/>
-                    <a:lumOff val="25000"/>
-                  </a:prstClr>
-                </a:solidFill>
-              </a:rPr>
               <a:t>tab</a:t>
-            </a:r>
-            <a:endParaRPr lang="hr-HR" dirty="0" smtClean="0">
-              <a:solidFill>
-                <a:prstClr val="black">
-                  <a:lumMod val="75000"/>
-                  <a:lumOff val="25000"/>
-                </a:prstClr>
-              </a:solidFill>
-            </a:endParaRPr>
-          </a:p>
-          <a:p>
-            <a:pPr lvl="2">
-              <a:buClr>
-                <a:srgbClr val="90C226"/>
-              </a:buClr>
-            </a:pPr>
-            <a:r>
-              <a:rPr lang="hr-HR" dirty="0" smtClean="0">
-                <a:solidFill>
-                  <a:prstClr val="black">
-                    <a:lumMod val="75000"/>
-                    <a:lumOff val="25000"/>
-                  </a:prstClr>
-                </a:solidFill>
-              </a:rPr>
-              <a:t>prikazuje sve korisnike s kojima je korisnik čiji se profil pregledava u nekoj vrsti veze</a:t>
-            </a:r>
-          </a:p>
-          <a:p>
-            <a:pPr lvl="2">
-              <a:buClr>
-                <a:srgbClr val="90C226"/>
-              </a:buClr>
-            </a:pPr>
-            <a:r>
-              <a:rPr lang="hr-HR" dirty="0" smtClean="0">
-                <a:solidFill>
-                  <a:prstClr val="black">
-                    <a:lumMod val="75000"/>
-                    <a:lumOff val="25000"/>
-                  </a:prstClr>
-                </a:solidFill>
-              </a:rPr>
-              <a:t>omogućuje uređivanje i brisanje vlastitih veza</a:t>
-            </a:r>
-          </a:p>
-          <a:p>
-            <a:pPr lvl="2">
-              <a:buClr>
-                <a:srgbClr val="90C226"/>
-              </a:buClr>
-            </a:pPr>
-            <a:r>
-              <a:rPr lang="hr-HR" dirty="0" smtClean="0">
-                <a:solidFill>
-                  <a:prstClr val="black">
-                    <a:lumMod val="75000"/>
-                    <a:lumOff val="25000"/>
-                  </a:prstClr>
-                </a:solidFill>
-              </a:rPr>
-              <a:t>veze su asinkrone(od user1 prema user2)</a:t>
-            </a:r>
-          </a:p>
-          <a:p>
-            <a:pPr lvl="2">
-              <a:buClr>
-                <a:srgbClr val="90C226"/>
-              </a:buClr>
-            </a:pPr>
-            <a:r>
-              <a:rPr lang="hr-HR" dirty="0" smtClean="0">
-                <a:solidFill>
-                  <a:prstClr val="black">
-                    <a:lumMod val="75000"/>
-                    <a:lumOff val="25000"/>
-                  </a:prstClr>
-                </a:solidFill>
-              </a:rPr>
-              <a:t>jedna osoba može biti u više veza </a:t>
-            </a:r>
-            <a:r>
-              <a:rPr lang="hr-HR" smtClean="0">
-                <a:solidFill>
-                  <a:prstClr val="black">
-                    <a:lumMod val="75000"/>
-                    <a:lumOff val="25000"/>
-                  </a:prstClr>
-                </a:solidFill>
-              </a:rPr>
-              <a:t>s nekom drugom osobom</a:t>
             </a:r>
             <a:endParaRPr lang="hr-HR" dirty="0">
               <a:solidFill>
@@ -6909,14 +7442,132 @@
             </a:endParaRPr>
           </a:p>
           <a:p>
+            <a:pPr lvl="2">
+              <a:buClr>
+                <a:srgbClr val="90C226"/>
+              </a:buClr>
+            </a:pPr>
+            <a:r>
+              <a:rPr lang="hr-HR" dirty="0">
+                <a:solidFill>
+                  <a:prstClr val="black">
+                    <a:lumMod val="75000"/>
+                    <a:lumOff val="25000"/>
+                  </a:prstClr>
+                </a:solidFill>
+              </a:rPr>
+              <a:t>prikazuje sve informacije o profilu(osobni podaci korisnika)</a:t>
+            </a:r>
+          </a:p>
+          <a:p>
+            <a:pPr lvl="2">
+              <a:buClr>
+                <a:srgbClr val="90C226"/>
+              </a:buClr>
+            </a:pPr>
+            <a:r>
+              <a:rPr lang="hr-HR" dirty="0">
+                <a:solidFill>
+                  <a:prstClr val="black">
+                    <a:lumMod val="75000"/>
+                    <a:lumOff val="25000"/>
+                  </a:prstClr>
+                </a:solidFill>
+              </a:rPr>
+              <a:t>omogućuje uređivanje podataka u obliku web obrasca(HTML </a:t>
+            </a:r>
+            <a:r>
+              <a:rPr lang="hr-HR" dirty="0" err="1">
+                <a:solidFill>
+                  <a:prstClr val="black">
+                    <a:lumMod val="75000"/>
+                    <a:lumOff val="25000"/>
+                  </a:prstClr>
+                </a:solidFill>
+              </a:rPr>
+              <a:t>form</a:t>
+            </a:r>
+            <a:r>
+              <a:rPr lang="hr-HR" dirty="0">
+                <a:solidFill>
+                  <a:prstClr val="black">
+                    <a:lumMod val="75000"/>
+                    <a:lumOff val="25000"/>
+                  </a:prstClr>
+                </a:solidFill>
+              </a:rPr>
+              <a:t>) </a:t>
+            </a:r>
+          </a:p>
+          <a:p>
             <a:endParaRPr lang="hr-HR" dirty="0"/>
           </a:p>
         </p:txBody>
       </p:sp>
+      <p:pic>
+        <p:nvPicPr>
+          <p:cNvPr id="4" name="Picture 3"/>
+          <p:cNvPicPr>
+            <a:picLocks noChangeAspect="1"/>
+          </p:cNvPicPr>
+          <p:nvPr/>
+        </p:nvPicPr>
+        <p:blipFill>
+          <a:blip r:embed="rId2">
+            <a:extLst>
+              <a:ext uri="{28A0092B-C50C-407E-A947-70E740481C1C}">
+                <a14:useLocalDpi xmlns:a14="http://schemas.microsoft.com/office/drawing/2010/main" val="0"/>
+              </a:ext>
+            </a:extLst>
+          </a:blip>
+          <a:stretch>
+            <a:fillRect/>
+          </a:stretch>
+        </p:blipFill>
+        <p:spPr>
+          <a:xfrm>
+            <a:off x="5581402" y="1731807"/>
+            <a:ext cx="6460176" cy="5087389"/>
+          </a:xfrm>
+          <a:prstGeom prst="rect">
+            <a:avLst/>
+          </a:prstGeom>
+        </p:spPr>
+      </p:pic>
+      <p:pic>
+        <p:nvPicPr>
+          <p:cNvPr id="6" name="Picture 5"/>
+          <p:cNvPicPr>
+            <a:picLocks noChangeAspect="1"/>
+          </p:cNvPicPr>
+          <p:nvPr/>
+        </p:nvPicPr>
+        <p:blipFill>
+          <a:blip r:embed="rId3">
+            <a:extLst>
+              <a:ext uri="{28A0092B-C50C-407E-A947-70E740481C1C}">
+                <a14:useLocalDpi xmlns:a14="http://schemas.microsoft.com/office/drawing/2010/main" val="0"/>
+              </a:ext>
+            </a:extLst>
+          </a:blip>
+          <a:stretch>
+            <a:fillRect/>
+          </a:stretch>
+        </p:blipFill>
+        <p:spPr>
+          <a:xfrm>
+            <a:off x="458501" y="1928995"/>
+            <a:ext cx="5027899" cy="4693012"/>
+          </a:xfrm>
+          <a:prstGeom prst="rect">
+            <a:avLst/>
+          </a:prstGeom>
+        </p:spPr>
+      </p:pic>
     </p:spTree>
     <p:extLst>
       <p:ext uri="{BB962C8B-B14F-4D97-AF65-F5344CB8AC3E}">
-        <p14:creationId xmlns:p14="http://schemas.microsoft.com/office/powerpoint/2010/main" val="2793625219"/>
+        <p14:creationId xmlns:p14="http://schemas.microsoft.com/office/powerpoint/2010/main" val="3033739603"/>
       </p:ext>
     </p:extLst>
   </p:cSld>
@@ -7136,6 +7787,1317 @@
       </p:par>
     </p:tnLst>
   </p:timing>
+</p:sld>
+</file>
+
+<file path=ppt/slides/slide20.xml><?xml version="1.0" encoding="utf-8"?>
+<p:sld xmlns:a="http://schemas.openxmlformats.org/drawingml/2006/main" xmlns:r="http://schemas.openxmlformats.org/officeDocument/2006/relationships" xmlns:p="http://schemas.openxmlformats.org/presentationml/2006/main">
+  <p:cSld>
+    <p:spTree>
+      <p:nvGrpSpPr>
+        <p:cNvPr id="1" name=""/>
+        <p:cNvGrpSpPr/>
+        <p:nvPr/>
+      </p:nvGrpSpPr>
+      <p:grpSpPr>
+        <a:xfrm>
+          <a:off x="0" y="0"/>
+          <a:ext cx="0" cy="0"/>
+          <a:chOff x="0" y="0"/>
+          <a:chExt cx="0" cy="0"/>
+        </a:xfrm>
+      </p:grpSpPr>
+      <p:sp>
+        <p:nvSpPr>
+          <p:cNvPr id="4" name="Content Placeholder 2"/>
+          <p:cNvSpPr>
+            <a:spLocks noGrp="1"/>
+          </p:cNvSpPr>
+          <p:nvPr>
+            <p:ph idx="1"/>
+          </p:nvPr>
+        </p:nvSpPr>
+        <p:spPr>
+          <a:xfrm>
+            <a:off x="736710" y="640548"/>
+            <a:ext cx="8596668" cy="3880773"/>
+          </a:xfrm>
+        </p:spPr>
+        <p:txBody>
+          <a:bodyPr/>
+          <a:lstStyle/>
+          <a:p>
+            <a:pPr lvl="1">
+              <a:buClr>
+                <a:srgbClr val="90C226"/>
+              </a:buClr>
+            </a:pPr>
+            <a:r>
+              <a:rPr lang="hr-HR" dirty="0" err="1" smtClean="0">
+                <a:solidFill>
+                  <a:prstClr val="black">
+                    <a:lumMod val="75000"/>
+                    <a:lumOff val="25000"/>
+                  </a:prstClr>
+                </a:solidFill>
+              </a:rPr>
+              <a:t>account</a:t>
+            </a:r>
+            <a:r>
+              <a:rPr lang="hr-HR" dirty="0" smtClean="0">
+                <a:solidFill>
+                  <a:prstClr val="black">
+                    <a:lumMod val="75000"/>
+                    <a:lumOff val="25000"/>
+                  </a:prstClr>
+                </a:solidFill>
+              </a:rPr>
+              <a:t> info </a:t>
+            </a:r>
+            <a:r>
+              <a:rPr lang="hr-HR" dirty="0" err="1" smtClean="0">
+                <a:solidFill>
+                  <a:prstClr val="black">
+                    <a:lumMod val="75000"/>
+                    <a:lumOff val="25000"/>
+                  </a:prstClr>
+                </a:solidFill>
+              </a:rPr>
+              <a:t>tab</a:t>
+            </a:r>
+            <a:endParaRPr lang="hr-HR" dirty="0">
+              <a:solidFill>
+                <a:prstClr val="black">
+                  <a:lumMod val="75000"/>
+                  <a:lumOff val="25000"/>
+                </a:prstClr>
+              </a:solidFill>
+            </a:endParaRPr>
+          </a:p>
+          <a:p>
+            <a:pPr lvl="2">
+              <a:buClr>
+                <a:srgbClr val="90C226"/>
+              </a:buClr>
+            </a:pPr>
+            <a:r>
+              <a:rPr lang="hr-HR" dirty="0">
+                <a:solidFill>
+                  <a:prstClr val="black">
+                    <a:lumMod val="75000"/>
+                    <a:lumOff val="25000"/>
+                  </a:prstClr>
+                </a:solidFill>
+              </a:rPr>
+              <a:t>prikazuje sve informacije o </a:t>
+            </a:r>
+            <a:r>
+              <a:rPr lang="hr-HR" dirty="0" smtClean="0">
+                <a:solidFill>
+                  <a:prstClr val="black">
+                    <a:lumMod val="75000"/>
+                    <a:lumOff val="25000"/>
+                  </a:prstClr>
+                </a:solidFill>
+              </a:rPr>
+              <a:t>računu(podaci računa korisnika</a:t>
+            </a:r>
+            <a:r>
+              <a:rPr lang="hr-HR" dirty="0">
+                <a:solidFill>
+                  <a:prstClr val="black">
+                    <a:lumMod val="75000"/>
+                    <a:lumOff val="25000"/>
+                  </a:prstClr>
+                </a:solidFill>
+              </a:rPr>
+              <a:t>)</a:t>
+            </a:r>
+          </a:p>
+          <a:p>
+            <a:pPr lvl="2">
+              <a:buClr>
+                <a:srgbClr val="90C226"/>
+              </a:buClr>
+            </a:pPr>
+            <a:r>
+              <a:rPr lang="hr-HR" dirty="0">
+                <a:solidFill>
+                  <a:prstClr val="black">
+                    <a:lumMod val="75000"/>
+                    <a:lumOff val="25000"/>
+                  </a:prstClr>
+                </a:solidFill>
+              </a:rPr>
+              <a:t>omogućuje </a:t>
+            </a:r>
+            <a:r>
+              <a:rPr lang="hr-HR" dirty="0" smtClean="0">
+                <a:solidFill>
+                  <a:prstClr val="black">
+                    <a:lumMod val="75000"/>
+                    <a:lumOff val="25000"/>
+                  </a:prstClr>
+                </a:solidFill>
+              </a:rPr>
+              <a:t>promjenu lozinke u </a:t>
+            </a:r>
+            <a:r>
+              <a:rPr lang="hr-HR" dirty="0">
+                <a:solidFill>
+                  <a:prstClr val="black">
+                    <a:lumMod val="75000"/>
+                    <a:lumOff val="25000"/>
+                  </a:prstClr>
+                </a:solidFill>
+              </a:rPr>
+              <a:t>obliku web obrasca(HTML </a:t>
+            </a:r>
+            <a:r>
+              <a:rPr lang="hr-HR" dirty="0" err="1">
+                <a:solidFill>
+                  <a:prstClr val="black">
+                    <a:lumMod val="75000"/>
+                    <a:lumOff val="25000"/>
+                  </a:prstClr>
+                </a:solidFill>
+              </a:rPr>
+              <a:t>form</a:t>
+            </a:r>
+            <a:r>
+              <a:rPr lang="hr-HR" dirty="0">
+                <a:solidFill>
+                  <a:prstClr val="black">
+                    <a:lumMod val="75000"/>
+                    <a:lumOff val="25000"/>
+                  </a:prstClr>
+                </a:solidFill>
+              </a:rPr>
+              <a:t>) </a:t>
+            </a:r>
+          </a:p>
+          <a:p>
+            <a:endParaRPr lang="hr-HR" dirty="0"/>
+          </a:p>
+        </p:txBody>
+      </p:sp>
+      <p:pic>
+        <p:nvPicPr>
+          <p:cNvPr id="5" name="Picture 4"/>
+          <p:cNvPicPr>
+            <a:picLocks noChangeAspect="1"/>
+          </p:cNvPicPr>
+          <p:nvPr/>
+        </p:nvPicPr>
+        <p:blipFill>
+          <a:blip r:embed="rId2">
+            <a:extLst>
+              <a:ext uri="{28A0092B-C50C-407E-A947-70E740481C1C}">
+                <a14:useLocalDpi xmlns:a14="http://schemas.microsoft.com/office/drawing/2010/main" val="0"/>
+              </a:ext>
+            </a:extLst>
+          </a:blip>
+          <a:stretch>
+            <a:fillRect/>
+          </a:stretch>
+        </p:blipFill>
+        <p:spPr>
+          <a:xfrm>
+            <a:off x="4001769" y="1793174"/>
+            <a:ext cx="5043488" cy="5064826"/>
+          </a:xfrm>
+          <a:prstGeom prst="rect">
+            <a:avLst/>
+          </a:prstGeom>
+        </p:spPr>
+      </p:pic>
+    </p:spTree>
+    <p:extLst>
+      <p:ext uri="{BB962C8B-B14F-4D97-AF65-F5344CB8AC3E}">
+        <p14:creationId xmlns:p14="http://schemas.microsoft.com/office/powerpoint/2010/main" val="2150683397"/>
+      </p:ext>
+    </p:extLst>
+  </p:cSld>
+  <p:clrMapOvr>
+    <a:masterClrMapping/>
+  </p:clrMapOvr>
+  <p:timing>
+    <p:tnLst>
+      <p:par>
+        <p:cTn id="1" dur="indefinite" restart="never" nodeType="tmRoot"/>
+      </p:par>
+    </p:tnLst>
+  </p:timing>
+</p:sld>
+</file>
+
+<file path=ppt/slides/slide21.xml><?xml version="1.0" encoding="utf-8"?>
+<p:sld xmlns:a="http://schemas.openxmlformats.org/drawingml/2006/main" xmlns:r="http://schemas.openxmlformats.org/officeDocument/2006/relationships" xmlns:p="http://schemas.openxmlformats.org/presentationml/2006/main">
+  <p:cSld>
+    <p:spTree>
+      <p:nvGrpSpPr>
+        <p:cNvPr id="1" name=""/>
+        <p:cNvGrpSpPr/>
+        <p:nvPr/>
+      </p:nvGrpSpPr>
+      <p:grpSpPr>
+        <a:xfrm>
+          <a:off x="0" y="0"/>
+          <a:ext cx="0" cy="0"/>
+          <a:chOff x="0" y="0"/>
+          <a:chExt cx="0" cy="0"/>
+        </a:xfrm>
+      </p:grpSpPr>
+      <p:sp>
+        <p:nvSpPr>
+          <p:cNvPr id="3" name="Content Placeholder 2"/>
+          <p:cNvSpPr>
+            <a:spLocks noGrp="1"/>
+          </p:cNvSpPr>
+          <p:nvPr>
+            <p:ph idx="1"/>
+          </p:nvPr>
+        </p:nvSpPr>
+        <p:spPr>
+          <a:xfrm>
+            <a:off x="653584" y="735550"/>
+            <a:ext cx="8596668" cy="3880773"/>
+          </a:xfrm>
+        </p:spPr>
+        <p:txBody>
+          <a:bodyPr/>
+          <a:lstStyle/>
+          <a:p>
+            <a:pPr lvl="1">
+              <a:buClr>
+                <a:srgbClr val="90C226"/>
+              </a:buClr>
+            </a:pPr>
+            <a:r>
+              <a:rPr lang="hr-HR" dirty="0" err="1">
+                <a:solidFill>
+                  <a:prstClr val="black">
+                    <a:lumMod val="75000"/>
+                    <a:lumOff val="25000"/>
+                  </a:prstClr>
+                </a:solidFill>
+              </a:rPr>
+              <a:t>contacts</a:t>
+            </a:r>
+            <a:r>
+              <a:rPr lang="hr-HR" dirty="0">
+                <a:solidFill>
+                  <a:prstClr val="black">
+                    <a:lumMod val="75000"/>
+                    <a:lumOff val="25000"/>
+                  </a:prstClr>
+                </a:solidFill>
+              </a:rPr>
+              <a:t> </a:t>
+            </a:r>
+            <a:r>
+              <a:rPr lang="hr-HR" dirty="0" err="1">
+                <a:solidFill>
+                  <a:prstClr val="black">
+                    <a:lumMod val="75000"/>
+                    <a:lumOff val="25000"/>
+                  </a:prstClr>
+                </a:solidFill>
+              </a:rPr>
+              <a:t>tab</a:t>
+            </a:r>
+            <a:endParaRPr lang="hr-HR" dirty="0">
+              <a:solidFill>
+                <a:prstClr val="black">
+                  <a:lumMod val="75000"/>
+                  <a:lumOff val="25000"/>
+                </a:prstClr>
+              </a:solidFill>
+            </a:endParaRPr>
+          </a:p>
+          <a:p>
+            <a:pPr lvl="2">
+              <a:buClr>
+                <a:srgbClr val="90C226"/>
+              </a:buClr>
+            </a:pPr>
+            <a:r>
+              <a:rPr lang="hr-HR" dirty="0">
+                <a:solidFill>
+                  <a:prstClr val="black">
+                    <a:lumMod val="75000"/>
+                    <a:lumOff val="25000"/>
+                  </a:prstClr>
+                </a:solidFill>
+              </a:rPr>
+              <a:t>prikazuje sve korisnike s kojima je korisnik čiji se profil pregledava u nekoj vrsti </a:t>
+            </a:r>
+            <a:r>
+              <a:rPr lang="hr-HR" dirty="0" smtClean="0">
+                <a:solidFill>
+                  <a:prstClr val="black">
+                    <a:lumMod val="75000"/>
+                    <a:lumOff val="25000"/>
+                  </a:prstClr>
+                </a:solidFill>
+              </a:rPr>
+              <a:t>veze</a:t>
+            </a:r>
+          </a:p>
+          <a:p>
+            <a:pPr lvl="2">
+              <a:buClr>
+                <a:srgbClr val="90C226"/>
+              </a:buClr>
+            </a:pPr>
+            <a:r>
+              <a:rPr lang="hr-HR" dirty="0" smtClean="0">
+                <a:solidFill>
+                  <a:prstClr val="black">
+                    <a:lumMod val="75000"/>
+                    <a:lumOff val="25000"/>
+                  </a:prstClr>
+                </a:solidFill>
+              </a:rPr>
+              <a:t>preciznije, prikazuje veze korisnika čiji se profil pregledava</a:t>
+            </a:r>
+            <a:endParaRPr lang="hr-HR" dirty="0">
+              <a:solidFill>
+                <a:prstClr val="black">
+                  <a:lumMod val="75000"/>
+                  <a:lumOff val="25000"/>
+                </a:prstClr>
+              </a:solidFill>
+            </a:endParaRPr>
+          </a:p>
+          <a:p>
+            <a:pPr lvl="2">
+              <a:buClr>
+                <a:srgbClr val="90C226"/>
+              </a:buClr>
+            </a:pPr>
+            <a:r>
+              <a:rPr lang="hr-HR" dirty="0">
+                <a:solidFill>
+                  <a:prstClr val="black">
+                    <a:lumMod val="75000"/>
+                    <a:lumOff val="25000"/>
+                  </a:prstClr>
+                </a:solidFill>
+              </a:rPr>
+              <a:t>omogućuje uređivanje i brisanje vlastitih veza</a:t>
+            </a:r>
+          </a:p>
+          <a:p>
+            <a:pPr lvl="2">
+              <a:buClr>
+                <a:srgbClr val="90C226"/>
+              </a:buClr>
+            </a:pPr>
+            <a:r>
+              <a:rPr lang="hr-HR" dirty="0">
+                <a:solidFill>
+                  <a:prstClr val="black">
+                    <a:lumMod val="75000"/>
+                    <a:lumOff val="25000"/>
+                  </a:prstClr>
+                </a:solidFill>
+              </a:rPr>
+              <a:t>veze su asinkrone(od user1 prema user2)</a:t>
+            </a:r>
+          </a:p>
+          <a:p>
+            <a:pPr lvl="2">
+              <a:buClr>
+                <a:srgbClr val="90C226"/>
+              </a:buClr>
+            </a:pPr>
+            <a:r>
+              <a:rPr lang="hr-HR" dirty="0">
+                <a:solidFill>
+                  <a:prstClr val="black">
+                    <a:lumMod val="75000"/>
+                    <a:lumOff val="25000"/>
+                  </a:prstClr>
+                </a:solidFill>
+              </a:rPr>
+              <a:t>jedna osoba može biti u više veza s nekom drugom osobom(npr., prijatelj i zaposlenik)</a:t>
+            </a:r>
+          </a:p>
+          <a:p>
+            <a:endParaRPr lang="hr-HR" dirty="0"/>
+          </a:p>
+        </p:txBody>
+      </p:sp>
+      <p:pic>
+        <p:nvPicPr>
+          <p:cNvPr id="4" name="Picture 3"/>
+          <p:cNvPicPr>
+            <a:picLocks noChangeAspect="1"/>
+          </p:cNvPicPr>
+          <p:nvPr/>
+        </p:nvPicPr>
+        <p:blipFill>
+          <a:blip r:embed="rId2">
+            <a:extLst>
+              <a:ext uri="{28A0092B-C50C-407E-A947-70E740481C1C}">
+                <a14:useLocalDpi xmlns:a14="http://schemas.microsoft.com/office/drawing/2010/main" val="0"/>
+              </a:ext>
+            </a:extLst>
+          </a:blip>
+          <a:stretch>
+            <a:fillRect/>
+          </a:stretch>
+        </p:blipFill>
+        <p:spPr>
+          <a:xfrm rot="16200000">
+            <a:off x="-712774" y="1799901"/>
+            <a:ext cx="4650581" cy="6858000"/>
+          </a:xfrm>
+          <a:prstGeom prst="rect">
+            <a:avLst/>
+          </a:prstGeom>
+        </p:spPr>
+      </p:pic>
+      <p:pic>
+        <p:nvPicPr>
+          <p:cNvPr id="5" name="Picture 4"/>
+          <p:cNvPicPr>
+            <a:picLocks noChangeAspect="1"/>
+          </p:cNvPicPr>
+          <p:nvPr/>
+        </p:nvPicPr>
+        <p:blipFill>
+          <a:blip r:embed="rId3">
+            <a:extLst>
+              <a:ext uri="{28A0092B-C50C-407E-A947-70E740481C1C}">
+                <a14:useLocalDpi xmlns:a14="http://schemas.microsoft.com/office/drawing/2010/main" val="0"/>
+              </a:ext>
+            </a:extLst>
+          </a:blip>
+          <a:stretch>
+            <a:fillRect/>
+          </a:stretch>
+        </p:blipFill>
+        <p:spPr>
+          <a:xfrm rot="16200000">
+            <a:off x="7537847" y="1187323"/>
+            <a:ext cx="2450306" cy="6858000"/>
+          </a:xfrm>
+          <a:prstGeom prst="rect">
+            <a:avLst/>
+          </a:prstGeom>
+        </p:spPr>
+      </p:pic>
+    </p:spTree>
+    <p:extLst>
+      <p:ext uri="{BB962C8B-B14F-4D97-AF65-F5344CB8AC3E}">
+        <p14:creationId xmlns:p14="http://schemas.microsoft.com/office/powerpoint/2010/main" val="1407805737"/>
+      </p:ext>
+    </p:extLst>
+  </p:cSld>
+  <p:clrMapOvr>
+    <a:masterClrMapping/>
+  </p:clrMapOvr>
+  <p:timing>
+    <p:tnLst>
+      <p:par>
+        <p:cTn id="1" dur="indefinite" restart="never" nodeType="tmRoot"/>
+      </p:par>
+    </p:tnLst>
+  </p:timing>
+</p:sld>
+</file>
+
+<file path=ppt/slides/slide22.xml><?xml version="1.0" encoding="utf-8"?>
+<p:sld xmlns:a="http://schemas.openxmlformats.org/drawingml/2006/main" xmlns:r="http://schemas.openxmlformats.org/officeDocument/2006/relationships" xmlns:p="http://schemas.openxmlformats.org/presentationml/2006/main">
+  <p:cSld>
+    <p:spTree>
+      <p:nvGrpSpPr>
+        <p:cNvPr id="1" name=""/>
+        <p:cNvGrpSpPr/>
+        <p:nvPr/>
+      </p:nvGrpSpPr>
+      <p:grpSpPr>
+        <a:xfrm>
+          <a:off x="0" y="0"/>
+          <a:ext cx="0" cy="0"/>
+          <a:chOff x="0" y="0"/>
+          <a:chExt cx="0" cy="0"/>
+        </a:xfrm>
+      </p:grpSpPr>
+      <p:sp>
+        <p:nvSpPr>
+          <p:cNvPr id="2" name="Title 1"/>
+          <p:cNvSpPr>
+            <a:spLocks noGrp="1"/>
+          </p:cNvSpPr>
+          <p:nvPr>
+            <p:ph type="title"/>
+          </p:nvPr>
+        </p:nvSpPr>
+        <p:spPr/>
+        <p:txBody>
+          <a:bodyPr/>
+          <a:lstStyle/>
+          <a:p>
+            <a:pPr algn="ctr"/>
+            <a:r>
+              <a:rPr lang="hr-HR" dirty="0" err="1" smtClean="0"/>
+              <a:t>Inbox</a:t>
+            </a:r>
+            <a:endParaRPr lang="hr-HR" dirty="0"/>
+          </a:p>
+        </p:txBody>
+      </p:sp>
+      <p:sp>
+        <p:nvSpPr>
+          <p:cNvPr id="3" name="Content Placeholder 2"/>
+          <p:cNvSpPr>
+            <a:spLocks noGrp="1"/>
+          </p:cNvSpPr>
+          <p:nvPr>
+            <p:ph idx="1"/>
+          </p:nvPr>
+        </p:nvSpPr>
+        <p:spPr>
+          <a:xfrm>
+            <a:off x="677334" y="1602449"/>
+            <a:ext cx="8596668" cy="3880773"/>
+          </a:xfrm>
+        </p:spPr>
+        <p:txBody>
+          <a:bodyPr/>
+          <a:lstStyle/>
+          <a:p>
+            <a:r>
+              <a:rPr lang="hr-HR" dirty="0" smtClean="0"/>
+              <a:t>chat, koji omogućuje komunikaciju korisnika porukama u stvarnom vremenu</a:t>
+            </a:r>
+            <a:endParaRPr lang="hr-HR" dirty="0"/>
+          </a:p>
+        </p:txBody>
+      </p:sp>
+      <p:pic>
+        <p:nvPicPr>
+          <p:cNvPr id="4" name="Picture 3"/>
+          <p:cNvPicPr>
+            <a:picLocks noChangeAspect="1"/>
+          </p:cNvPicPr>
+          <p:nvPr/>
+        </p:nvPicPr>
+        <p:blipFill>
+          <a:blip r:embed="rId2">
+            <a:extLst>
+              <a:ext uri="{28A0092B-C50C-407E-A947-70E740481C1C}">
+                <a14:useLocalDpi xmlns:a14="http://schemas.microsoft.com/office/drawing/2010/main" val="0"/>
+              </a:ext>
+            </a:extLst>
+          </a:blip>
+          <a:stretch>
+            <a:fillRect/>
+          </a:stretch>
+        </p:blipFill>
+        <p:spPr>
+          <a:xfrm>
+            <a:off x="2077462" y="2200825"/>
+            <a:ext cx="7196540" cy="4389982"/>
+          </a:xfrm>
+          <a:prstGeom prst="rect">
+            <a:avLst/>
+          </a:prstGeom>
+        </p:spPr>
+      </p:pic>
+    </p:spTree>
+    <p:extLst>
+      <p:ext uri="{BB962C8B-B14F-4D97-AF65-F5344CB8AC3E}">
+        <p14:creationId xmlns:p14="http://schemas.microsoft.com/office/powerpoint/2010/main" val="1963240856"/>
+      </p:ext>
+    </p:extLst>
+  </p:cSld>
+  <p:clrMapOvr>
+    <a:masterClrMapping/>
+  </p:clrMapOvr>
+</p:sld>
+</file>
+
+<file path=ppt/slides/slide23.xml><?xml version="1.0" encoding="utf-8"?>
+<p:sld xmlns:a="http://schemas.openxmlformats.org/drawingml/2006/main" xmlns:r="http://schemas.openxmlformats.org/officeDocument/2006/relationships" xmlns:p="http://schemas.openxmlformats.org/presentationml/2006/main">
+  <p:cSld>
+    <p:spTree>
+      <p:nvGrpSpPr>
+        <p:cNvPr id="1" name=""/>
+        <p:cNvGrpSpPr/>
+        <p:nvPr/>
+      </p:nvGrpSpPr>
+      <p:grpSpPr>
+        <a:xfrm>
+          <a:off x="0" y="0"/>
+          <a:ext cx="0" cy="0"/>
+          <a:chOff x="0" y="0"/>
+          <a:chExt cx="0" cy="0"/>
+        </a:xfrm>
+      </p:grpSpPr>
+      <p:sp>
+        <p:nvSpPr>
+          <p:cNvPr id="2" name="Title 1"/>
+          <p:cNvSpPr>
+            <a:spLocks noGrp="1"/>
+          </p:cNvSpPr>
+          <p:nvPr>
+            <p:ph type="title"/>
+          </p:nvPr>
+        </p:nvSpPr>
+        <p:spPr/>
+        <p:txBody>
+          <a:bodyPr/>
+          <a:lstStyle/>
+          <a:p>
+            <a:pPr algn="ctr"/>
+            <a:r>
+              <a:rPr lang="hr-HR" dirty="0" smtClean="0"/>
+              <a:t>Tehnologije i alati</a:t>
+            </a:r>
+            <a:endParaRPr lang="hr-HR" dirty="0"/>
+          </a:p>
+        </p:txBody>
+      </p:sp>
+      <p:sp>
+        <p:nvSpPr>
+          <p:cNvPr id="3" name="Content Placeholder 2"/>
+          <p:cNvSpPr>
+            <a:spLocks noGrp="1"/>
+          </p:cNvSpPr>
+          <p:nvPr>
+            <p:ph idx="1"/>
+          </p:nvPr>
+        </p:nvSpPr>
+        <p:spPr>
+          <a:xfrm>
+            <a:off x="677334" y="2945021"/>
+            <a:ext cx="8596668" cy="1592013"/>
+          </a:xfrm>
+        </p:spPr>
+        <p:txBody>
+          <a:bodyPr>
+            <a:normAutofit/>
+          </a:bodyPr>
+          <a:lstStyle/>
+          <a:p>
+            <a:r>
+              <a:rPr lang="hr-HR" dirty="0" smtClean="0"/>
+              <a:t>android:</a:t>
+            </a:r>
+          </a:p>
+          <a:p>
+            <a:pPr lvl="1"/>
+            <a:r>
+              <a:rPr lang="hr-HR" dirty="0" smtClean="0"/>
+              <a:t>java, Android Studio, </a:t>
+            </a:r>
+            <a:r>
+              <a:rPr lang="hr-HR" dirty="0" err="1" smtClean="0"/>
+              <a:t>Genymotion</a:t>
+            </a:r>
+            <a:endParaRPr lang="hr-HR" dirty="0"/>
+          </a:p>
+          <a:p>
+            <a:pPr marL="457200" lvl="1" indent="0">
+              <a:buNone/>
+            </a:pPr>
+            <a:r>
+              <a:rPr lang="hr-HR" dirty="0" smtClean="0"/>
+              <a:t> </a:t>
+            </a:r>
+            <a:endParaRPr lang="hr-HR" dirty="0"/>
+          </a:p>
+        </p:txBody>
+      </p:sp>
+      <p:sp>
+        <p:nvSpPr>
+          <p:cNvPr id="4" name="Content Placeholder 2"/>
+          <p:cNvSpPr txBox="1">
+            <a:spLocks/>
+          </p:cNvSpPr>
+          <p:nvPr/>
+        </p:nvSpPr>
+        <p:spPr>
+          <a:xfrm>
+            <a:off x="677334" y="4296170"/>
+            <a:ext cx="8596668" cy="1592013"/>
+          </a:xfrm>
+          <a:prstGeom prst="rect">
+            <a:avLst/>
+          </a:prstGeom>
+        </p:spPr>
+        <p:txBody>
+          <a:bodyPr vert="horz" lIns="91440" tIns="45720" rIns="91440" bIns="45720" rtlCol="0">
+            <a:normAutofit/>
+          </a:bodyPr>
+          <a:lstStyle>
+            <a:lvl1pPr marL="342900" indent="-342900" algn="l" defTabSz="457200" rtl="0" eaLnBrk="1" latinLnBrk="0" hangingPunct="1">
+              <a:spcBef>
+                <a:spcPts val="1000"/>
+              </a:spcBef>
+              <a:spcAft>
+                <a:spcPts val="0"/>
+              </a:spcAft>
+              <a:buClr>
+                <a:schemeClr val="accent1"/>
+              </a:buClr>
+              <a:buSzPct val="80000"/>
+              <a:buFont typeface="Wingdings 3" charset="2"/>
+              <a:buChar char=""/>
+              <a:defRPr sz="1800" kern="1200">
+                <a:solidFill>
+                  <a:schemeClr val="tx1">
+                    <a:lumMod val="75000"/>
+                    <a:lumOff val="25000"/>
+                  </a:schemeClr>
+                </a:solidFill>
+                <a:latin typeface="+mn-lt"/>
+                <a:ea typeface="+mn-ea"/>
+                <a:cs typeface="+mn-cs"/>
+              </a:defRPr>
+            </a:lvl1pPr>
+            <a:lvl2pPr marL="742950" indent="-285750" algn="l" defTabSz="457200" rtl="0" eaLnBrk="1" latinLnBrk="0" hangingPunct="1">
+              <a:spcBef>
+                <a:spcPts val="1000"/>
+              </a:spcBef>
+              <a:spcAft>
+                <a:spcPts val="0"/>
+              </a:spcAft>
+              <a:buClr>
+                <a:schemeClr val="accent1"/>
+              </a:buClr>
+              <a:buSzPct val="80000"/>
+              <a:buFont typeface="Wingdings 3" charset="2"/>
+              <a:buChar char=""/>
+              <a:defRPr sz="1600" kern="1200">
+                <a:solidFill>
+                  <a:schemeClr val="tx1">
+                    <a:lumMod val="75000"/>
+                    <a:lumOff val="25000"/>
+                  </a:schemeClr>
+                </a:solidFill>
+                <a:latin typeface="+mn-lt"/>
+                <a:ea typeface="+mn-ea"/>
+                <a:cs typeface="+mn-cs"/>
+              </a:defRPr>
+            </a:lvl2pPr>
+            <a:lvl3pPr marL="1143000" indent="-228600" algn="l" defTabSz="457200" rtl="0" eaLnBrk="1" latinLnBrk="0" hangingPunct="1">
+              <a:spcBef>
+                <a:spcPts val="1000"/>
+              </a:spcBef>
+              <a:spcAft>
+                <a:spcPts val="0"/>
+              </a:spcAft>
+              <a:buClr>
+                <a:schemeClr val="accent1"/>
+              </a:buClr>
+              <a:buSzPct val="80000"/>
+              <a:buFont typeface="Wingdings 3" charset="2"/>
+              <a:buChar char=""/>
+              <a:defRPr sz="1400" kern="1200">
+                <a:solidFill>
+                  <a:schemeClr val="tx1">
+                    <a:lumMod val="75000"/>
+                    <a:lumOff val="25000"/>
+                  </a:schemeClr>
+                </a:solidFill>
+                <a:latin typeface="+mn-lt"/>
+                <a:ea typeface="+mn-ea"/>
+                <a:cs typeface="+mn-cs"/>
+              </a:defRPr>
+            </a:lvl3pPr>
+            <a:lvl4pPr marL="1600200" indent="-228600" algn="l" defTabSz="457200" rtl="0" eaLnBrk="1" latinLnBrk="0" hangingPunct="1">
+              <a:spcBef>
+                <a:spcPts val="1000"/>
+              </a:spcBef>
+              <a:spcAft>
+                <a:spcPts val="0"/>
+              </a:spcAft>
+              <a:buClr>
+                <a:schemeClr val="accent1"/>
+              </a:buClr>
+              <a:buSzPct val="80000"/>
+              <a:buFont typeface="Wingdings 3" charset="2"/>
+              <a:buChar char=""/>
+              <a:defRPr sz="1200" kern="1200">
+                <a:solidFill>
+                  <a:schemeClr val="tx1">
+                    <a:lumMod val="75000"/>
+                    <a:lumOff val="25000"/>
+                  </a:schemeClr>
+                </a:solidFill>
+                <a:latin typeface="+mn-lt"/>
+                <a:ea typeface="+mn-ea"/>
+                <a:cs typeface="+mn-cs"/>
+              </a:defRPr>
+            </a:lvl4pPr>
+            <a:lvl5pPr marL="2057400" indent="-228600" algn="l" defTabSz="457200" rtl="0" eaLnBrk="1" latinLnBrk="0" hangingPunct="1">
+              <a:spcBef>
+                <a:spcPts val="1000"/>
+              </a:spcBef>
+              <a:spcAft>
+                <a:spcPts val="0"/>
+              </a:spcAft>
+              <a:buClr>
+                <a:schemeClr val="accent1"/>
+              </a:buClr>
+              <a:buSzPct val="80000"/>
+              <a:buFont typeface="Wingdings 3" charset="2"/>
+              <a:buChar char=""/>
+              <a:defRPr sz="1200" kern="1200">
+                <a:solidFill>
+                  <a:schemeClr val="tx1">
+                    <a:lumMod val="75000"/>
+                    <a:lumOff val="25000"/>
+                  </a:schemeClr>
+                </a:solidFill>
+                <a:latin typeface="+mn-lt"/>
+                <a:ea typeface="+mn-ea"/>
+                <a:cs typeface="+mn-cs"/>
+              </a:defRPr>
+            </a:lvl5pPr>
+            <a:lvl6pPr marL="2514600" indent="-228600" algn="l" defTabSz="457200" rtl="0" eaLnBrk="1" latinLnBrk="0" hangingPunct="1">
+              <a:spcBef>
+                <a:spcPts val="1000"/>
+              </a:spcBef>
+              <a:spcAft>
+                <a:spcPts val="0"/>
+              </a:spcAft>
+              <a:buClr>
+                <a:schemeClr val="accent1"/>
+              </a:buClr>
+              <a:buSzPct val="80000"/>
+              <a:buFont typeface="Wingdings 3" charset="2"/>
+              <a:buChar char=""/>
+              <a:defRPr sz="1200" kern="1200">
+                <a:solidFill>
+                  <a:schemeClr val="tx1">
+                    <a:lumMod val="75000"/>
+                    <a:lumOff val="25000"/>
+                  </a:schemeClr>
+                </a:solidFill>
+                <a:latin typeface="+mn-lt"/>
+                <a:ea typeface="+mn-ea"/>
+                <a:cs typeface="+mn-cs"/>
+              </a:defRPr>
+            </a:lvl6pPr>
+            <a:lvl7pPr marL="2971800" indent="-228600" algn="l" defTabSz="457200" rtl="0" eaLnBrk="1" latinLnBrk="0" hangingPunct="1">
+              <a:spcBef>
+                <a:spcPts val="1000"/>
+              </a:spcBef>
+              <a:spcAft>
+                <a:spcPts val="0"/>
+              </a:spcAft>
+              <a:buClr>
+                <a:schemeClr val="accent1"/>
+              </a:buClr>
+              <a:buSzPct val="80000"/>
+              <a:buFont typeface="Wingdings 3" charset="2"/>
+              <a:buChar char=""/>
+              <a:defRPr sz="1200" kern="1200">
+                <a:solidFill>
+                  <a:schemeClr val="tx1">
+                    <a:lumMod val="75000"/>
+                    <a:lumOff val="25000"/>
+                  </a:schemeClr>
+                </a:solidFill>
+                <a:latin typeface="+mn-lt"/>
+                <a:ea typeface="+mn-ea"/>
+                <a:cs typeface="+mn-cs"/>
+              </a:defRPr>
+            </a:lvl7pPr>
+            <a:lvl8pPr marL="3429000" indent="-228600" algn="l" defTabSz="457200" rtl="0" eaLnBrk="1" latinLnBrk="0" hangingPunct="1">
+              <a:spcBef>
+                <a:spcPts val="1000"/>
+              </a:spcBef>
+              <a:spcAft>
+                <a:spcPts val="0"/>
+              </a:spcAft>
+              <a:buClr>
+                <a:schemeClr val="accent1"/>
+              </a:buClr>
+              <a:buSzPct val="80000"/>
+              <a:buFont typeface="Wingdings 3" charset="2"/>
+              <a:buChar char=""/>
+              <a:defRPr sz="1200" kern="1200">
+                <a:solidFill>
+                  <a:schemeClr val="tx1">
+                    <a:lumMod val="75000"/>
+                    <a:lumOff val="25000"/>
+                  </a:schemeClr>
+                </a:solidFill>
+                <a:latin typeface="+mn-lt"/>
+                <a:ea typeface="+mn-ea"/>
+                <a:cs typeface="+mn-cs"/>
+              </a:defRPr>
+            </a:lvl8pPr>
+            <a:lvl9pPr marL="3886200" indent="-228600" algn="l" defTabSz="457200" rtl="0" eaLnBrk="1" latinLnBrk="0" hangingPunct="1">
+              <a:spcBef>
+                <a:spcPts val="1000"/>
+              </a:spcBef>
+              <a:spcAft>
+                <a:spcPts val="0"/>
+              </a:spcAft>
+              <a:buClr>
+                <a:schemeClr val="accent1"/>
+              </a:buClr>
+              <a:buSzPct val="80000"/>
+              <a:buFont typeface="Wingdings 3" charset="2"/>
+              <a:buChar char=""/>
+              <a:defRPr sz="1200" kern="1200">
+                <a:solidFill>
+                  <a:schemeClr val="tx1">
+                    <a:lumMod val="75000"/>
+                    <a:lumOff val="25000"/>
+                  </a:schemeClr>
+                </a:solidFill>
+                <a:latin typeface="+mn-lt"/>
+                <a:ea typeface="+mn-ea"/>
+                <a:cs typeface="+mn-cs"/>
+              </a:defRPr>
+            </a:lvl9pPr>
+          </a:lstStyle>
+          <a:p>
+            <a:r>
+              <a:rPr lang="hr-HR" dirty="0" smtClean="0"/>
+              <a:t>web-</a:t>
+            </a:r>
+            <a:r>
+              <a:rPr lang="hr-HR" dirty="0" err="1" smtClean="0"/>
+              <a:t>backend</a:t>
+            </a:r>
+            <a:r>
+              <a:rPr lang="hr-HR" dirty="0" smtClean="0"/>
+              <a:t>:</a:t>
+            </a:r>
+          </a:p>
+          <a:p>
+            <a:pPr lvl="1"/>
+            <a:r>
+              <a:rPr lang="hr-HR" dirty="0" err="1" smtClean="0"/>
+              <a:t>node-js</a:t>
+            </a:r>
+            <a:r>
+              <a:rPr lang="hr-HR" dirty="0" smtClean="0"/>
+              <a:t>, </a:t>
+            </a:r>
+            <a:r>
+              <a:rPr lang="hr-HR" dirty="0" err="1" smtClean="0"/>
+              <a:t>javascript</a:t>
+            </a:r>
+            <a:endParaRPr lang="hr-HR" dirty="0"/>
+          </a:p>
+        </p:txBody>
+      </p:sp>
+      <p:sp>
+        <p:nvSpPr>
+          <p:cNvPr id="5" name="Content Placeholder 2"/>
+          <p:cNvSpPr txBox="1">
+            <a:spLocks/>
+          </p:cNvSpPr>
+          <p:nvPr/>
+        </p:nvSpPr>
+        <p:spPr>
+          <a:xfrm>
+            <a:off x="829734" y="1624221"/>
+            <a:ext cx="8596668" cy="1157903"/>
+          </a:xfrm>
+          <a:prstGeom prst="rect">
+            <a:avLst/>
+          </a:prstGeom>
+        </p:spPr>
+        <p:txBody>
+          <a:bodyPr vert="horz" lIns="91440" tIns="45720" rIns="91440" bIns="45720" rtlCol="0">
+            <a:normAutofit/>
+          </a:bodyPr>
+          <a:lstStyle>
+            <a:lvl1pPr marL="342900" indent="-342900" algn="l" defTabSz="457200" rtl="0" eaLnBrk="1" latinLnBrk="0" hangingPunct="1">
+              <a:spcBef>
+                <a:spcPts val="1000"/>
+              </a:spcBef>
+              <a:spcAft>
+                <a:spcPts val="0"/>
+              </a:spcAft>
+              <a:buClr>
+                <a:schemeClr val="accent1"/>
+              </a:buClr>
+              <a:buSzPct val="80000"/>
+              <a:buFont typeface="Wingdings 3" charset="2"/>
+              <a:buChar char=""/>
+              <a:defRPr sz="1800" kern="1200">
+                <a:solidFill>
+                  <a:schemeClr val="tx1">
+                    <a:lumMod val="75000"/>
+                    <a:lumOff val="25000"/>
+                  </a:schemeClr>
+                </a:solidFill>
+                <a:latin typeface="+mn-lt"/>
+                <a:ea typeface="+mn-ea"/>
+                <a:cs typeface="+mn-cs"/>
+              </a:defRPr>
+            </a:lvl1pPr>
+            <a:lvl2pPr marL="742950" indent="-285750" algn="l" defTabSz="457200" rtl="0" eaLnBrk="1" latinLnBrk="0" hangingPunct="1">
+              <a:spcBef>
+                <a:spcPts val="1000"/>
+              </a:spcBef>
+              <a:spcAft>
+                <a:spcPts val="0"/>
+              </a:spcAft>
+              <a:buClr>
+                <a:schemeClr val="accent1"/>
+              </a:buClr>
+              <a:buSzPct val="80000"/>
+              <a:buFont typeface="Wingdings 3" charset="2"/>
+              <a:buChar char=""/>
+              <a:defRPr sz="1600" kern="1200">
+                <a:solidFill>
+                  <a:schemeClr val="tx1">
+                    <a:lumMod val="75000"/>
+                    <a:lumOff val="25000"/>
+                  </a:schemeClr>
+                </a:solidFill>
+                <a:latin typeface="+mn-lt"/>
+                <a:ea typeface="+mn-ea"/>
+                <a:cs typeface="+mn-cs"/>
+              </a:defRPr>
+            </a:lvl2pPr>
+            <a:lvl3pPr marL="1143000" indent="-228600" algn="l" defTabSz="457200" rtl="0" eaLnBrk="1" latinLnBrk="0" hangingPunct="1">
+              <a:spcBef>
+                <a:spcPts val="1000"/>
+              </a:spcBef>
+              <a:spcAft>
+                <a:spcPts val="0"/>
+              </a:spcAft>
+              <a:buClr>
+                <a:schemeClr val="accent1"/>
+              </a:buClr>
+              <a:buSzPct val="80000"/>
+              <a:buFont typeface="Wingdings 3" charset="2"/>
+              <a:buChar char=""/>
+              <a:defRPr sz="1400" kern="1200">
+                <a:solidFill>
+                  <a:schemeClr val="tx1">
+                    <a:lumMod val="75000"/>
+                    <a:lumOff val="25000"/>
+                  </a:schemeClr>
+                </a:solidFill>
+                <a:latin typeface="+mn-lt"/>
+                <a:ea typeface="+mn-ea"/>
+                <a:cs typeface="+mn-cs"/>
+              </a:defRPr>
+            </a:lvl3pPr>
+            <a:lvl4pPr marL="1600200" indent="-228600" algn="l" defTabSz="457200" rtl="0" eaLnBrk="1" latinLnBrk="0" hangingPunct="1">
+              <a:spcBef>
+                <a:spcPts val="1000"/>
+              </a:spcBef>
+              <a:spcAft>
+                <a:spcPts val="0"/>
+              </a:spcAft>
+              <a:buClr>
+                <a:schemeClr val="accent1"/>
+              </a:buClr>
+              <a:buSzPct val="80000"/>
+              <a:buFont typeface="Wingdings 3" charset="2"/>
+              <a:buChar char=""/>
+              <a:defRPr sz="1200" kern="1200">
+                <a:solidFill>
+                  <a:schemeClr val="tx1">
+                    <a:lumMod val="75000"/>
+                    <a:lumOff val="25000"/>
+                  </a:schemeClr>
+                </a:solidFill>
+                <a:latin typeface="+mn-lt"/>
+                <a:ea typeface="+mn-ea"/>
+                <a:cs typeface="+mn-cs"/>
+              </a:defRPr>
+            </a:lvl4pPr>
+            <a:lvl5pPr marL="2057400" indent="-228600" algn="l" defTabSz="457200" rtl="0" eaLnBrk="1" latinLnBrk="0" hangingPunct="1">
+              <a:spcBef>
+                <a:spcPts val="1000"/>
+              </a:spcBef>
+              <a:spcAft>
+                <a:spcPts val="0"/>
+              </a:spcAft>
+              <a:buClr>
+                <a:schemeClr val="accent1"/>
+              </a:buClr>
+              <a:buSzPct val="80000"/>
+              <a:buFont typeface="Wingdings 3" charset="2"/>
+              <a:buChar char=""/>
+              <a:defRPr sz="1200" kern="1200">
+                <a:solidFill>
+                  <a:schemeClr val="tx1">
+                    <a:lumMod val="75000"/>
+                    <a:lumOff val="25000"/>
+                  </a:schemeClr>
+                </a:solidFill>
+                <a:latin typeface="+mn-lt"/>
+                <a:ea typeface="+mn-ea"/>
+                <a:cs typeface="+mn-cs"/>
+              </a:defRPr>
+            </a:lvl5pPr>
+            <a:lvl6pPr marL="2514600" indent="-228600" algn="l" defTabSz="457200" rtl="0" eaLnBrk="1" latinLnBrk="0" hangingPunct="1">
+              <a:spcBef>
+                <a:spcPts val="1000"/>
+              </a:spcBef>
+              <a:spcAft>
+                <a:spcPts val="0"/>
+              </a:spcAft>
+              <a:buClr>
+                <a:schemeClr val="accent1"/>
+              </a:buClr>
+              <a:buSzPct val="80000"/>
+              <a:buFont typeface="Wingdings 3" charset="2"/>
+              <a:buChar char=""/>
+              <a:defRPr sz="1200" kern="1200">
+                <a:solidFill>
+                  <a:schemeClr val="tx1">
+                    <a:lumMod val="75000"/>
+                    <a:lumOff val="25000"/>
+                  </a:schemeClr>
+                </a:solidFill>
+                <a:latin typeface="+mn-lt"/>
+                <a:ea typeface="+mn-ea"/>
+                <a:cs typeface="+mn-cs"/>
+              </a:defRPr>
+            </a:lvl6pPr>
+            <a:lvl7pPr marL="2971800" indent="-228600" algn="l" defTabSz="457200" rtl="0" eaLnBrk="1" latinLnBrk="0" hangingPunct="1">
+              <a:spcBef>
+                <a:spcPts val="1000"/>
+              </a:spcBef>
+              <a:spcAft>
+                <a:spcPts val="0"/>
+              </a:spcAft>
+              <a:buClr>
+                <a:schemeClr val="accent1"/>
+              </a:buClr>
+              <a:buSzPct val="80000"/>
+              <a:buFont typeface="Wingdings 3" charset="2"/>
+              <a:buChar char=""/>
+              <a:defRPr sz="1200" kern="1200">
+                <a:solidFill>
+                  <a:schemeClr val="tx1">
+                    <a:lumMod val="75000"/>
+                    <a:lumOff val="25000"/>
+                  </a:schemeClr>
+                </a:solidFill>
+                <a:latin typeface="+mn-lt"/>
+                <a:ea typeface="+mn-ea"/>
+                <a:cs typeface="+mn-cs"/>
+              </a:defRPr>
+            </a:lvl7pPr>
+            <a:lvl8pPr marL="3429000" indent="-228600" algn="l" defTabSz="457200" rtl="0" eaLnBrk="1" latinLnBrk="0" hangingPunct="1">
+              <a:spcBef>
+                <a:spcPts val="1000"/>
+              </a:spcBef>
+              <a:spcAft>
+                <a:spcPts val="0"/>
+              </a:spcAft>
+              <a:buClr>
+                <a:schemeClr val="accent1"/>
+              </a:buClr>
+              <a:buSzPct val="80000"/>
+              <a:buFont typeface="Wingdings 3" charset="2"/>
+              <a:buChar char=""/>
+              <a:defRPr sz="1200" kern="1200">
+                <a:solidFill>
+                  <a:schemeClr val="tx1">
+                    <a:lumMod val="75000"/>
+                    <a:lumOff val="25000"/>
+                  </a:schemeClr>
+                </a:solidFill>
+                <a:latin typeface="+mn-lt"/>
+                <a:ea typeface="+mn-ea"/>
+                <a:cs typeface="+mn-cs"/>
+              </a:defRPr>
+            </a:lvl8pPr>
+            <a:lvl9pPr marL="3886200" indent="-228600" algn="l" defTabSz="457200" rtl="0" eaLnBrk="1" latinLnBrk="0" hangingPunct="1">
+              <a:spcBef>
+                <a:spcPts val="1000"/>
+              </a:spcBef>
+              <a:spcAft>
+                <a:spcPts val="0"/>
+              </a:spcAft>
+              <a:buClr>
+                <a:schemeClr val="accent1"/>
+              </a:buClr>
+              <a:buSzPct val="80000"/>
+              <a:buFont typeface="Wingdings 3" charset="2"/>
+              <a:buChar char=""/>
+              <a:defRPr sz="1200" kern="1200">
+                <a:solidFill>
+                  <a:schemeClr val="tx1">
+                    <a:lumMod val="75000"/>
+                    <a:lumOff val="25000"/>
+                  </a:schemeClr>
+                </a:solidFill>
+                <a:latin typeface="+mn-lt"/>
+                <a:ea typeface="+mn-ea"/>
+                <a:cs typeface="+mn-cs"/>
+              </a:defRPr>
+            </a:lvl9pPr>
+          </a:lstStyle>
+          <a:p>
+            <a:r>
+              <a:rPr lang="hr-HR" dirty="0" smtClean="0"/>
+              <a:t>web-</a:t>
+            </a:r>
+            <a:r>
+              <a:rPr lang="hr-HR" dirty="0" err="1" smtClean="0"/>
+              <a:t>frontend</a:t>
+            </a:r>
+            <a:r>
+              <a:rPr lang="hr-HR" dirty="0" smtClean="0"/>
+              <a:t>:</a:t>
+            </a:r>
+          </a:p>
+          <a:p>
+            <a:pPr lvl="1"/>
+            <a:r>
+              <a:rPr lang="hr-HR" dirty="0" smtClean="0"/>
+              <a:t>HTML, CSS, BOOTSTRAP, </a:t>
+            </a:r>
+            <a:r>
+              <a:rPr lang="hr-HR" dirty="0" err="1" smtClean="0"/>
+              <a:t>javascript</a:t>
+            </a:r>
+            <a:r>
+              <a:rPr lang="hr-HR" dirty="0" smtClean="0"/>
+              <a:t>, </a:t>
+            </a:r>
+            <a:r>
+              <a:rPr lang="hr-HR" dirty="0" err="1" smtClean="0"/>
+              <a:t>jQuery</a:t>
+            </a:r>
+            <a:endParaRPr lang="hr-HR" dirty="0" smtClean="0"/>
+          </a:p>
+          <a:p>
+            <a:pPr marL="457200" lvl="1" indent="0">
+              <a:buFont typeface="Wingdings 3" charset="2"/>
+              <a:buNone/>
+            </a:pPr>
+            <a:r>
+              <a:rPr lang="hr-HR" dirty="0" smtClean="0"/>
+              <a:t> </a:t>
+            </a:r>
+            <a:endParaRPr lang="hr-HR" dirty="0"/>
+          </a:p>
+        </p:txBody>
+      </p:sp>
+    </p:spTree>
+    <p:extLst>
+      <p:ext uri="{BB962C8B-B14F-4D97-AF65-F5344CB8AC3E}">
+        <p14:creationId xmlns:p14="http://schemas.microsoft.com/office/powerpoint/2010/main" val="1225574384"/>
+      </p:ext>
+    </p:extLst>
+  </p:cSld>
+  <p:clrMapOvr>
+    <a:masterClrMapping/>
+  </p:clrMapOvr>
 </p:sld>
 </file>
 
@@ -8706,7 +10668,7 @@
         </p:blipFill>
         <p:spPr>
           <a:xfrm>
-            <a:off x="398726" y="226097"/>
+            <a:off x="3403184" y="166720"/>
             <a:ext cx="3832080" cy="6457373"/>
           </a:xfrm>
         </p:spPr>

</xml_diff>

<commit_message>
Konačna verzija prve prezentacije.
</commit_message>
<xml_diff>
--- a/resursi/management/Bubbles.pptx
+++ b/resursi/management/Bubbles.pptx
@@ -26,8 +26,12 @@
     <p:sldId id="273" r:id="rId20"/>
     <p:sldId id="275" r:id="rId21"/>
     <p:sldId id="274" r:id="rId22"/>
-    <p:sldId id="277" r:id="rId23"/>
-    <p:sldId id="278" r:id="rId24"/>
+    <p:sldId id="281" r:id="rId23"/>
+    <p:sldId id="277" r:id="rId24"/>
+    <p:sldId id="278" r:id="rId25"/>
+    <p:sldId id="280" r:id="rId26"/>
+    <p:sldId id="282" r:id="rId27"/>
+    <p:sldId id="279" r:id="rId28"/>
   </p:sldIdLst>
   <p:sldSz cx="12192000" cy="6858000"/>
   <p:notesSz cx="6858000" cy="9144000"/>
@@ -5993,7 +5997,15 @@
           <a:p>
             <a:r>
               <a:rPr lang="hr-HR" dirty="0" smtClean="0"/>
-              <a:t>prikazuje najvažnije informacije o korisničkom računu trenutno prijavljenog korisnika(korisničko ime, naslovna fotografija)</a:t>
+              <a:t>prikazuje najvažnije informacije o korisničkom računu trenutno prijavljenog </a:t>
+            </a:r>
+            <a:r>
+              <a:rPr lang="hr-HR" dirty="0" smtClean="0"/>
+              <a:t>korisnika (</a:t>
+            </a:r>
+            <a:r>
+              <a:rPr lang="hr-HR" dirty="0" smtClean="0"/>
+              <a:t>korisničko ime, naslovna fotografija)</a:t>
             </a:r>
           </a:p>
           <a:p>
@@ -6009,7 +6021,31 @@
             <a:pPr lvl="1"/>
             <a:r>
               <a:rPr lang="hr-HR" dirty="0" smtClean="0"/>
-              <a:t>omogućuje uređivanje postova(vlastitih), dodavanje novih postova, brisanje starih postova(vlastitih), komentiranje postojećih postova(vlastitih i tuđih)</a:t>
+              <a:t>omogućuje uređivanje </a:t>
+            </a:r>
+            <a:r>
+              <a:rPr lang="hr-HR" dirty="0" smtClean="0"/>
+              <a:t>postova (</a:t>
+            </a:r>
+            <a:r>
+              <a:rPr lang="hr-HR" dirty="0" smtClean="0"/>
+              <a:t>vlastitih), dodavanje novih postova, brisanje starih </a:t>
+            </a:r>
+            <a:r>
+              <a:rPr lang="hr-HR" dirty="0" smtClean="0"/>
+              <a:t>postova (</a:t>
+            </a:r>
+            <a:r>
+              <a:rPr lang="hr-HR" dirty="0" smtClean="0"/>
+              <a:t>vlastitih), komentiranje postojećih </a:t>
+            </a:r>
+            <a:r>
+              <a:rPr lang="hr-HR" dirty="0" smtClean="0"/>
+              <a:t>postova (</a:t>
+            </a:r>
+            <a:r>
+              <a:rPr lang="hr-HR" dirty="0" smtClean="0"/>
+              <a:t>vlastitih i tuđih)</a:t>
             </a:r>
           </a:p>
           <a:p>
@@ -6025,7 +6061,15 @@
           <a:p>
             <a:r>
               <a:rPr lang="hr-HR" dirty="0" smtClean="0"/>
-              <a:t>nudi pristup svim skupinama funkcionalnosti društvene mreže(pristup vlastitom profilu, chat, pristup profilu i naslovnoj stranici drugih korisnika, pristup vlastitim mjehurićima, pristup postavkama računa, …) </a:t>
+              <a:t>nudi pristup svim skupinama funkcionalnosti društvene </a:t>
+            </a:r>
+            <a:r>
+              <a:rPr lang="hr-HR" dirty="0" smtClean="0"/>
+              <a:t>mreže (</a:t>
+            </a:r>
+            <a:r>
+              <a:rPr lang="hr-HR" dirty="0" smtClean="0"/>
+              <a:t>pristup vlastitom profilu, chat, pristup profilu i naslovnoj stranici drugih korisnika, pristup vlastitim mjehurićima, pristup postavkama računa, …) </a:t>
             </a:r>
           </a:p>
           <a:p>
@@ -6235,7 +6279,7 @@
           <a:p>
             <a:r>
               <a:rPr lang="hr-HR" dirty="0" smtClean="0"/>
-              <a:t>koristi se vanjski, „forumski”, besplatni uređivač teksta otvorenog koda(</a:t>
+              <a:t>koristi se vanjski, „forumski”, besplatni uređivač teksta otvorenog koda (</a:t>
             </a:r>
             <a:r>
               <a:rPr lang="hr-HR" b="1" dirty="0" err="1" smtClean="0"/>
@@ -6250,7 +6294,7 @@
           <a:p>
             <a:r>
               <a:rPr lang="hr-HR" dirty="0" smtClean="0"/>
-              <a:t>omogućuje puno različitih funkcionalnosti(dodavanje slika, videa, formatiranje teksta, itd.)</a:t>
+              <a:t>omogućuje puno različitih funkcionalnosti (dodavanje slika, videa, formatiranje teksta, itd.)</a:t>
             </a:r>
             <a:endParaRPr lang="hr-HR" dirty="0"/>
           </a:p>
@@ -6377,7 +6421,11 @@
           <a:p>
             <a:r>
               <a:rPr lang="hr-HR" dirty="0" smtClean="0"/>
-              <a:t>podijeljena u nekoliko pododjeljaka(</a:t>
+              <a:t>podijeljena u nekoliko </a:t>
+            </a:r>
+            <a:r>
+              <a:rPr lang="hr-HR" dirty="0" smtClean="0"/>
+              <a:t>pododjeljaka (</a:t>
             </a:r>
             <a:r>
               <a:rPr lang="hr-HR" dirty="0" err="1" smtClean="0"/>
@@ -6442,7 +6490,7 @@
         </p:blipFill>
         <p:spPr>
           <a:xfrm>
-            <a:off x="5747657" y="2153166"/>
+            <a:off x="5866410" y="2153166"/>
             <a:ext cx="6444343" cy="4551834"/>
           </a:xfrm>
           <a:prstGeom prst="rect">
@@ -6522,7 +6570,7 @@
             </a:r>
             <a:r>
               <a:rPr lang="hr-HR" dirty="0" smtClean="0"/>
-              <a:t>(</a:t>
+              <a:t> (</a:t>
             </a:r>
             <a:r>
               <a:rPr lang="hr-HR" dirty="0" err="1" smtClean="0"/>
@@ -6545,7 +6593,15 @@
             <a:pPr lvl="3"/>
             <a:r>
               <a:rPr lang="hr-HR" dirty="0"/>
-              <a:t>postovi sadrže tekst, multimediju(slika, video), poveznice na druge web stranice i sadržaje</a:t>
+              <a:t>postovi sadrže tekst, </a:t>
+            </a:r>
+            <a:r>
+              <a:rPr lang="hr-HR" dirty="0" smtClean="0"/>
+              <a:t>multimediju (</a:t>
+            </a:r>
+            <a:r>
+              <a:rPr lang="hr-HR" dirty="0"/>
+              <a:t>slika, video), poveznice na druge web stranice i sadržaje</a:t>
             </a:r>
           </a:p>
           <a:p>
@@ -6769,7 +6825,7 @@
                   </a:prstClr>
                 </a:solidFill>
               </a:rPr>
-              <a:t>(</a:t>
+              <a:t> (</a:t>
             </a:r>
             <a:r>
               <a:rPr lang="hr-HR" dirty="0" err="1" smtClean="0">
@@ -7272,7 +7328,7 @@
             </a:r>
             <a:r>
               <a:rPr lang="hr-HR" dirty="0" smtClean="0"/>
-              <a:t> je kolekcija objava(post) i multimedije(slika, video), koja ima neku tematiku(npr., putovanje, </a:t>
+              <a:t> je kolekcija objava (post) i multimedije (slika, video), koja ima neku tematiku (npr., putovanje, </a:t>
             </a:r>
             <a:r>
               <a:rPr lang="hr-HR" dirty="0" err="1" smtClean="0"/>
@@ -7456,7 +7512,29 @@
                   </a:prstClr>
                 </a:solidFill>
               </a:rPr>
-              <a:t>prikazuje sve informacije o profilu(osobni podaci korisnika)</a:t>
+              <a:t>prikazuje sve informacije o </a:t>
+            </a:r>
+            <a:r>
+              <a:rPr lang="hr-HR" dirty="0" smtClean="0">
+                <a:solidFill>
+                  <a:prstClr val="black">
+                    <a:lumMod val="75000"/>
+                    <a:lumOff val="25000"/>
+                  </a:prstClr>
+                </a:solidFill>
+              </a:rPr>
+              <a:t>profilu (</a:t>
+            </a:r>
+            <a:r>
+              <a:rPr lang="hr-HR" dirty="0">
+                <a:solidFill>
+                  <a:prstClr val="black">
+                    <a:lumMod val="75000"/>
+                    <a:lumOff val="25000"/>
+                  </a:prstClr>
+                </a:solidFill>
+              </a:rPr>
+              <a:t>osobni podaci korisnika)</a:t>
             </a:r>
           </a:p>
           <a:p>
@@ -7474,7 +7552,29 @@
                   </a:prstClr>
                 </a:solidFill>
               </a:rPr>
-              <a:t>omogućuje uređivanje podataka u obliku web obrasca(HTML </a:t>
+              <a:t>omogućuje uređivanje podataka u obliku web </a:t>
+            </a:r>
+            <a:r>
+              <a:rPr lang="hr-HR" dirty="0" smtClean="0">
+                <a:solidFill>
+                  <a:prstClr val="black">
+                    <a:lumMod val="75000"/>
+                    <a:lumOff val="25000"/>
+                  </a:prstClr>
+                </a:solidFill>
+              </a:rPr>
+              <a:t>obrasca (</a:t>
+            </a:r>
+            <a:r>
+              <a:rPr lang="hr-HR" dirty="0">
+                <a:solidFill>
+                  <a:prstClr val="black">
+                    <a:lumMod val="75000"/>
+                    <a:lumOff val="25000"/>
+                  </a:prstClr>
+                </a:solidFill>
+              </a:rPr>
+              <a:t>HTML </a:t>
             </a:r>
             <a:r>
               <a:rPr lang="hr-HR" dirty="0" err="1">
@@ -7676,7 +7776,11 @@
             <a:pPr lvl="1"/>
             <a:r>
               <a:rPr lang="hr-HR" dirty="0" smtClean="0"/>
-              <a:t>stvaranje korisničkog računa(</a:t>
+              <a:t>stvaranje korisničkog </a:t>
+            </a:r>
+            <a:r>
+              <a:rPr lang="hr-HR" dirty="0" smtClean="0"/>
+              <a:t>računa (</a:t>
             </a:r>
             <a:r>
               <a:rPr lang="hr-HR" dirty="0" err="1" smtClean="0"/>
@@ -7691,7 +7795,15 @@
             <a:pPr lvl="1"/>
             <a:r>
               <a:rPr lang="hr-HR" dirty="0" smtClean="0"/>
-              <a:t>prijavljivanje u mrežu korištenjem podataka postojećeg računa(login)</a:t>
+              <a:t>prijavljivanje u mrežu korištenjem podataka postojećeg </a:t>
+            </a:r>
+            <a:r>
+              <a:rPr lang="hr-HR" dirty="0" smtClean="0"/>
+              <a:t>računa (</a:t>
+            </a:r>
+            <a:r>
+              <a:rPr lang="hr-HR" dirty="0" smtClean="0"/>
+              <a:t>login)</a:t>
             </a:r>
           </a:p>
           <a:p>
@@ -7716,7 +7828,11 @@
             </a:r>
             <a:r>
               <a:rPr lang="hr-HR" dirty="0" smtClean="0"/>
-              <a:t>osobnih podataka(</a:t>
+              <a:t>osobnih </a:t>
+            </a:r>
+            <a:r>
+              <a:rPr lang="hr-HR" dirty="0" smtClean="0"/>
+              <a:t>podataka (</a:t>
             </a:r>
             <a:r>
               <a:rPr lang="hr-HR" dirty="0" err="1" smtClean="0"/>
@@ -7739,7 +7855,11 @@
             <a:pPr lvl="1"/>
             <a:r>
               <a:rPr lang="hr-HR" dirty="0" smtClean="0"/>
-              <a:t>uređivanje podataka računa(</a:t>
+              <a:t>uređivanje podataka </a:t>
+            </a:r>
+            <a:r>
+              <a:rPr lang="hr-HR" dirty="0" smtClean="0"/>
+              <a:t>računa (</a:t>
             </a:r>
             <a:r>
               <a:rPr lang="hr-HR" dirty="0" err="1" smtClean="0"/>
@@ -7754,7 +7874,15 @@
             <a:pPr lvl="1"/>
             <a:r>
               <a:rPr lang="hr-HR" dirty="0" smtClean="0"/>
-              <a:t>objavljivanje, uređivanje, brisanje vijesti(post) na </a:t>
+              <a:t>objavljivanje, uređivanje, brisanje </a:t>
+            </a:r>
+            <a:r>
+              <a:rPr lang="hr-HR" dirty="0" smtClean="0"/>
+              <a:t>vijesti (</a:t>
+            </a:r>
+            <a:r>
+              <a:rPr lang="hr-HR" dirty="0" smtClean="0"/>
+              <a:t>post) na </a:t>
             </a:r>
             <a:r>
               <a:rPr lang="hr-HR" dirty="0" err="1" smtClean="0"/>
@@ -7762,7 +7890,11 @@
             </a:r>
             <a:r>
               <a:rPr lang="hr-HR" dirty="0" smtClean="0"/>
-              <a:t>(vremenska crta) mjehuriću</a:t>
+              <a:t> (</a:t>
+            </a:r>
+            <a:r>
+              <a:rPr lang="hr-HR" dirty="0" smtClean="0"/>
+              <a:t>vremenska crta) mjehuriću</a:t>
             </a:r>
           </a:p>
           <a:p>
@@ -7900,7 +8032,7 @@
                   </a:prstClr>
                 </a:solidFill>
               </a:rPr>
-              <a:t>računu(podaci računa korisnika</a:t>
+              <a:t>računu (podaci računa korisnika</a:t>
             </a:r>
             <a:r>
               <a:rPr lang="hr-HR" dirty="0">
@@ -7951,7 +8083,29 @@
                   </a:prstClr>
                 </a:solidFill>
               </a:rPr>
-              <a:t>obliku web obrasca(HTML </a:t>
+              <a:t>obliku web </a:t>
+            </a:r>
+            <a:r>
+              <a:rPr lang="hr-HR" dirty="0" smtClean="0">
+                <a:solidFill>
+                  <a:prstClr val="black">
+                    <a:lumMod val="75000"/>
+                    <a:lumOff val="25000"/>
+                  </a:prstClr>
+                </a:solidFill>
+              </a:rPr>
+              <a:t>obrasca (</a:t>
+            </a:r>
+            <a:r>
+              <a:rPr lang="hr-HR" dirty="0">
+                <a:solidFill>
+                  <a:prstClr val="black">
+                    <a:lumMod val="75000"/>
+                    <a:lumOff val="25000"/>
+                  </a:prstClr>
+                </a:solidFill>
+              </a:rPr>
+              <a:t>HTML </a:t>
             </a:r>
             <a:r>
               <a:rPr lang="hr-HR" dirty="0" err="1">
@@ -8203,7 +8357,29 @@
                   </a:prstClr>
                 </a:solidFill>
               </a:rPr>
-              <a:t>veze su asinkrone(od user1 prema user2)</a:t>
+              <a:t>veze su </a:t>
+            </a:r>
+            <a:r>
+              <a:rPr lang="hr-HR" dirty="0" smtClean="0">
+                <a:solidFill>
+                  <a:prstClr val="black">
+                    <a:lumMod val="75000"/>
+                    <a:lumOff val="25000"/>
+                  </a:prstClr>
+                </a:solidFill>
+              </a:rPr>
+              <a:t>asinkrone (</a:t>
+            </a:r>
+            <a:r>
+              <a:rPr lang="hr-HR" dirty="0">
+                <a:solidFill>
+                  <a:prstClr val="black">
+                    <a:lumMod val="75000"/>
+                    <a:lumOff val="25000"/>
+                  </a:prstClr>
+                </a:solidFill>
+              </a:rPr>
+              <a:t>od user1 prema user2)</a:t>
             </a:r>
           </a:p>
           <a:p>
@@ -8221,7 +8397,29 @@
                   </a:prstClr>
                 </a:solidFill>
               </a:rPr>
-              <a:t>jedna osoba može biti u više veza s nekom drugom osobom(npr., prijatelj i zaposlenik)</a:t>
+              <a:t>jedna osoba može biti u više veza s nekom drugom </a:t>
+            </a:r>
+            <a:r>
+              <a:rPr lang="hr-HR" dirty="0" smtClean="0">
+                <a:solidFill>
+                  <a:prstClr val="black">
+                    <a:lumMod val="75000"/>
+                    <a:lumOff val="25000"/>
+                  </a:prstClr>
+                </a:solidFill>
+              </a:rPr>
+              <a:t>osobom (</a:t>
+            </a:r>
+            <a:r>
+              <a:rPr lang="hr-HR" dirty="0">
+                <a:solidFill>
+                  <a:prstClr val="black">
+                    <a:lumMod val="75000"/>
+                    <a:lumOff val="25000"/>
+                  </a:prstClr>
+                </a:solidFill>
+              </a:rPr>
+              <a:t>npr., prijatelj i zaposlenik)</a:t>
             </a:r>
           </a:p>
           <a:p>
@@ -8281,7 +8479,7 @@
         </p:blipFill>
         <p:spPr>
           <a:xfrm rot="16200000">
-            <a:off x="7537847" y="1187323"/>
+            <a:off x="7245364" y="1187323"/>
             <a:ext cx="2450306" cy="6858000"/>
           </a:xfrm>
           <a:prstGeom prst="rect">
@@ -8341,6 +8539,91 @@
           <a:bodyPr/>
           <a:lstStyle/>
           <a:p>
+            <a:endParaRPr lang="hr-HR"/>
+          </a:p>
+        </p:txBody>
+      </p:sp>
+      <p:pic>
+        <p:nvPicPr>
+          <p:cNvPr id="4" name="Content Placeholder 3"/>
+          <p:cNvPicPr>
+            <a:picLocks noGrp="1" noChangeAspect="1"/>
+          </p:cNvPicPr>
+          <p:nvPr>
+            <p:ph idx="1"/>
+          </p:nvPr>
+        </p:nvPicPr>
+        <p:blipFill>
+          <a:blip r:embed="rId2">
+            <a:extLst>
+              <a:ext uri="{28A0092B-C50C-407E-A947-70E740481C1C}">
+                <a14:useLocalDpi xmlns:a14="http://schemas.microsoft.com/office/drawing/2010/main" val="0"/>
+              </a:ext>
+            </a:extLst>
+          </a:blip>
+          <a:stretch>
+            <a:fillRect/>
+          </a:stretch>
+        </p:blipFill>
+        <p:spPr>
+          <a:xfrm>
+            <a:off x="2578896" y="130628"/>
+            <a:ext cx="5840709" cy="6590684"/>
+          </a:xfrm>
+        </p:spPr>
+      </p:pic>
+    </p:spTree>
+    <p:extLst>
+      <p:ext uri="{BB962C8B-B14F-4D97-AF65-F5344CB8AC3E}">
+        <p14:creationId xmlns:p14="http://schemas.microsoft.com/office/powerpoint/2010/main" val="3149141805"/>
+      </p:ext>
+    </p:extLst>
+  </p:cSld>
+  <p:clrMapOvr>
+    <a:masterClrMapping/>
+  </p:clrMapOvr>
+  <p:timing>
+    <p:tnLst>
+      <p:par>
+        <p:cTn id="1" dur="indefinite" restart="never" nodeType="tmRoot"/>
+      </p:par>
+    </p:tnLst>
+  </p:timing>
+</p:sld>
+</file>
+
+<file path=ppt/slides/slide23.xml><?xml version="1.0" encoding="utf-8"?>
+<p:sld xmlns:a="http://schemas.openxmlformats.org/drawingml/2006/main" xmlns:r="http://schemas.openxmlformats.org/officeDocument/2006/relationships" xmlns:p="http://schemas.openxmlformats.org/presentationml/2006/main">
+  <p:cSld>
+    <p:spTree>
+      <p:nvGrpSpPr>
+        <p:cNvPr id="1" name=""/>
+        <p:cNvGrpSpPr/>
+        <p:nvPr/>
+      </p:nvGrpSpPr>
+      <p:grpSpPr>
+        <a:xfrm>
+          <a:off x="0" y="0"/>
+          <a:ext cx="0" cy="0"/>
+          <a:chOff x="0" y="0"/>
+          <a:chExt cx="0" cy="0"/>
+        </a:xfrm>
+      </p:grpSpPr>
+      <p:sp>
+        <p:nvSpPr>
+          <p:cNvPr id="2" name="Title 1"/>
+          <p:cNvSpPr>
+            <a:spLocks noGrp="1"/>
+          </p:cNvSpPr>
+          <p:nvPr>
+            <p:ph type="title"/>
+          </p:nvPr>
+        </p:nvSpPr>
+        <p:spPr/>
+        <p:txBody>
+          <a:bodyPr/>
+          <a:lstStyle/>
+          <a:p>
             <a:pPr algn="ctr"/>
             <a:r>
               <a:rPr lang="hr-HR" dirty="0" err="1" smtClean="0"/>
@@ -8418,10 +8701,17 @@
   <p:clrMapOvr>
     <a:masterClrMapping/>
   </p:clrMapOvr>
+  <p:timing>
+    <p:tnLst>
+      <p:par>
+        <p:cTn id="1" dur="indefinite" restart="never" nodeType="tmRoot"/>
+      </p:par>
+    </p:tnLst>
+  </p:timing>
 </p:sld>
 </file>
 
-<file path=ppt/slides/slide23.xml><?xml version="1.0" encoding="utf-8"?>
+<file path=ppt/slides/slide24.xml><?xml version="1.0" encoding="utf-8"?>
 <p:sld xmlns:a="http://schemas.openxmlformats.org/drawingml/2006/main" xmlns:r="http://schemas.openxmlformats.org/officeDocument/2006/relationships" xmlns:p="http://schemas.openxmlformats.org/presentationml/2006/main">
   <p:cSld>
     <p:spTree>
@@ -8474,7 +8764,7 @@
         </p:nvSpPr>
         <p:spPr>
           <a:xfrm>
-            <a:off x="677334" y="2945021"/>
+            <a:off x="829734" y="2388530"/>
             <a:ext cx="8596668" cy="1592013"/>
           </a:xfrm>
         </p:spPr>
@@ -8493,11 +8783,14 @@
             <a:pPr lvl="1"/>
             <a:r>
               <a:rPr lang="hr-HR" dirty="0" smtClean="0"/>
-              <a:t>java, Android Studio, </a:t>
-            </a:r>
-            <a:r>
-              <a:rPr lang="hr-HR" dirty="0" err="1" smtClean="0"/>
-              <a:t>Genymotion</a:t>
+              <a:t>java</a:t>
+            </a:r>
+          </a:p>
+          <a:p>
+            <a:pPr lvl="1"/>
+            <a:r>
+              <a:rPr lang="hr-HR" dirty="0" smtClean="0"/>
+              <a:t>Android Studio</a:t>
             </a:r>
             <a:endParaRPr lang="hr-HR" dirty="0"/>
           </a:p>
@@ -8523,7 +8816,7 @@
         </p:nvSpPr>
         <p:spPr>
           <a:xfrm>
-            <a:off x="677334" y="4296170"/>
+            <a:off x="829734" y="3523224"/>
             <a:ext cx="8596668" cy="1592013"/>
           </a:xfrm>
           <a:prstGeom prst="rect">
@@ -8789,6 +9082,50 @@
               <a:rPr lang="hr-HR" dirty="0" err="1" smtClean="0"/>
               <a:t>javascript</a:t>
             </a:r>
+            <a:endParaRPr lang="hr-HR" dirty="0" smtClean="0"/>
+          </a:p>
+          <a:p>
+            <a:pPr lvl="1"/>
+            <a:r>
+              <a:rPr lang="hr-HR" dirty="0" err="1" smtClean="0"/>
+              <a:t>express</a:t>
+            </a:r>
+            <a:r>
+              <a:rPr lang="hr-HR" dirty="0" smtClean="0"/>
+              <a:t> web </a:t>
+            </a:r>
+            <a:r>
+              <a:rPr lang="hr-HR" dirty="0" err="1" smtClean="0"/>
+              <a:t>application</a:t>
+            </a:r>
+            <a:r>
+              <a:rPr lang="hr-HR" dirty="0" smtClean="0"/>
+              <a:t> </a:t>
+            </a:r>
+            <a:r>
+              <a:rPr lang="hr-HR" dirty="0" err="1" smtClean="0"/>
+              <a:t>framework</a:t>
+            </a:r>
+            <a:endParaRPr lang="hr-HR" dirty="0" smtClean="0"/>
+          </a:p>
+          <a:p>
+            <a:pPr lvl="1"/>
+            <a:r>
+              <a:rPr lang="hr-HR" dirty="0" smtClean="0"/>
+              <a:t>ORM : </a:t>
+            </a:r>
+            <a:r>
+              <a:rPr lang="hr-HR" dirty="0" err="1" smtClean="0"/>
+              <a:t>bookshelf</a:t>
+            </a:r>
+            <a:endParaRPr lang="hr-HR" dirty="0" smtClean="0"/>
+          </a:p>
+          <a:p>
+            <a:pPr lvl="1"/>
+            <a:endParaRPr lang="hr-HR" dirty="0" smtClean="0"/>
+          </a:p>
+          <a:p>
+            <a:pPr lvl="1"/>
             <a:endParaRPr lang="hr-HR" dirty="0"/>
           </a:p>
         </p:txBody>
@@ -8803,8 +9140,338 @@
         </p:nvSpPr>
         <p:spPr>
           <a:xfrm>
-            <a:off x="829734" y="1624221"/>
-            <a:ext cx="8596668" cy="1157903"/>
+            <a:off x="829734" y="1270000"/>
+            <a:ext cx="9632427" cy="1439613"/>
+          </a:xfrm>
+          <a:prstGeom prst="rect">
+            <a:avLst/>
+          </a:prstGeom>
+        </p:spPr>
+        <p:txBody>
+          <a:bodyPr vert="horz" lIns="91440" tIns="45720" rIns="91440" bIns="45720" rtlCol="0">
+            <a:normAutofit lnSpcReduction="10000"/>
+          </a:bodyPr>
+          <a:lstStyle>
+            <a:lvl1pPr marL="342900" indent="-342900" algn="l" defTabSz="457200" rtl="0" eaLnBrk="1" latinLnBrk="0" hangingPunct="1">
+              <a:spcBef>
+                <a:spcPts val="1000"/>
+              </a:spcBef>
+              <a:spcAft>
+                <a:spcPts val="0"/>
+              </a:spcAft>
+              <a:buClr>
+                <a:schemeClr val="accent1"/>
+              </a:buClr>
+              <a:buSzPct val="80000"/>
+              <a:buFont typeface="Wingdings 3" charset="2"/>
+              <a:buChar char=""/>
+              <a:defRPr sz="1800" kern="1200">
+                <a:solidFill>
+                  <a:schemeClr val="tx1">
+                    <a:lumMod val="75000"/>
+                    <a:lumOff val="25000"/>
+                  </a:schemeClr>
+                </a:solidFill>
+                <a:latin typeface="+mn-lt"/>
+                <a:ea typeface="+mn-ea"/>
+                <a:cs typeface="+mn-cs"/>
+              </a:defRPr>
+            </a:lvl1pPr>
+            <a:lvl2pPr marL="742950" indent="-285750" algn="l" defTabSz="457200" rtl="0" eaLnBrk="1" latinLnBrk="0" hangingPunct="1">
+              <a:spcBef>
+                <a:spcPts val="1000"/>
+              </a:spcBef>
+              <a:spcAft>
+                <a:spcPts val="0"/>
+              </a:spcAft>
+              <a:buClr>
+                <a:schemeClr val="accent1"/>
+              </a:buClr>
+              <a:buSzPct val="80000"/>
+              <a:buFont typeface="Wingdings 3" charset="2"/>
+              <a:buChar char=""/>
+              <a:defRPr sz="1600" kern="1200">
+                <a:solidFill>
+                  <a:schemeClr val="tx1">
+                    <a:lumMod val="75000"/>
+                    <a:lumOff val="25000"/>
+                  </a:schemeClr>
+                </a:solidFill>
+                <a:latin typeface="+mn-lt"/>
+                <a:ea typeface="+mn-ea"/>
+                <a:cs typeface="+mn-cs"/>
+              </a:defRPr>
+            </a:lvl2pPr>
+            <a:lvl3pPr marL="1143000" indent="-228600" algn="l" defTabSz="457200" rtl="0" eaLnBrk="1" latinLnBrk="0" hangingPunct="1">
+              <a:spcBef>
+                <a:spcPts val="1000"/>
+              </a:spcBef>
+              <a:spcAft>
+                <a:spcPts val="0"/>
+              </a:spcAft>
+              <a:buClr>
+                <a:schemeClr val="accent1"/>
+              </a:buClr>
+              <a:buSzPct val="80000"/>
+              <a:buFont typeface="Wingdings 3" charset="2"/>
+              <a:buChar char=""/>
+              <a:defRPr sz="1400" kern="1200">
+                <a:solidFill>
+                  <a:schemeClr val="tx1">
+                    <a:lumMod val="75000"/>
+                    <a:lumOff val="25000"/>
+                  </a:schemeClr>
+                </a:solidFill>
+                <a:latin typeface="+mn-lt"/>
+                <a:ea typeface="+mn-ea"/>
+                <a:cs typeface="+mn-cs"/>
+              </a:defRPr>
+            </a:lvl3pPr>
+            <a:lvl4pPr marL="1600200" indent="-228600" algn="l" defTabSz="457200" rtl="0" eaLnBrk="1" latinLnBrk="0" hangingPunct="1">
+              <a:spcBef>
+                <a:spcPts val="1000"/>
+              </a:spcBef>
+              <a:spcAft>
+                <a:spcPts val="0"/>
+              </a:spcAft>
+              <a:buClr>
+                <a:schemeClr val="accent1"/>
+              </a:buClr>
+              <a:buSzPct val="80000"/>
+              <a:buFont typeface="Wingdings 3" charset="2"/>
+              <a:buChar char=""/>
+              <a:defRPr sz="1200" kern="1200">
+                <a:solidFill>
+                  <a:schemeClr val="tx1">
+                    <a:lumMod val="75000"/>
+                    <a:lumOff val="25000"/>
+                  </a:schemeClr>
+                </a:solidFill>
+                <a:latin typeface="+mn-lt"/>
+                <a:ea typeface="+mn-ea"/>
+                <a:cs typeface="+mn-cs"/>
+              </a:defRPr>
+            </a:lvl4pPr>
+            <a:lvl5pPr marL="2057400" indent="-228600" algn="l" defTabSz="457200" rtl="0" eaLnBrk="1" latinLnBrk="0" hangingPunct="1">
+              <a:spcBef>
+                <a:spcPts val="1000"/>
+              </a:spcBef>
+              <a:spcAft>
+                <a:spcPts val="0"/>
+              </a:spcAft>
+              <a:buClr>
+                <a:schemeClr val="accent1"/>
+              </a:buClr>
+              <a:buSzPct val="80000"/>
+              <a:buFont typeface="Wingdings 3" charset="2"/>
+              <a:buChar char=""/>
+              <a:defRPr sz="1200" kern="1200">
+                <a:solidFill>
+                  <a:schemeClr val="tx1">
+                    <a:lumMod val="75000"/>
+                    <a:lumOff val="25000"/>
+                  </a:schemeClr>
+                </a:solidFill>
+                <a:latin typeface="+mn-lt"/>
+                <a:ea typeface="+mn-ea"/>
+                <a:cs typeface="+mn-cs"/>
+              </a:defRPr>
+            </a:lvl5pPr>
+            <a:lvl6pPr marL="2514600" indent="-228600" algn="l" defTabSz="457200" rtl="0" eaLnBrk="1" latinLnBrk="0" hangingPunct="1">
+              <a:spcBef>
+                <a:spcPts val="1000"/>
+              </a:spcBef>
+              <a:spcAft>
+                <a:spcPts val="0"/>
+              </a:spcAft>
+              <a:buClr>
+                <a:schemeClr val="accent1"/>
+              </a:buClr>
+              <a:buSzPct val="80000"/>
+              <a:buFont typeface="Wingdings 3" charset="2"/>
+              <a:buChar char=""/>
+              <a:defRPr sz="1200" kern="1200">
+                <a:solidFill>
+                  <a:schemeClr val="tx1">
+                    <a:lumMod val="75000"/>
+                    <a:lumOff val="25000"/>
+                  </a:schemeClr>
+                </a:solidFill>
+                <a:latin typeface="+mn-lt"/>
+                <a:ea typeface="+mn-ea"/>
+                <a:cs typeface="+mn-cs"/>
+              </a:defRPr>
+            </a:lvl6pPr>
+            <a:lvl7pPr marL="2971800" indent="-228600" algn="l" defTabSz="457200" rtl="0" eaLnBrk="1" latinLnBrk="0" hangingPunct="1">
+              <a:spcBef>
+                <a:spcPts val="1000"/>
+              </a:spcBef>
+              <a:spcAft>
+                <a:spcPts val="0"/>
+              </a:spcAft>
+              <a:buClr>
+                <a:schemeClr val="accent1"/>
+              </a:buClr>
+              <a:buSzPct val="80000"/>
+              <a:buFont typeface="Wingdings 3" charset="2"/>
+              <a:buChar char=""/>
+              <a:defRPr sz="1200" kern="1200">
+                <a:solidFill>
+                  <a:schemeClr val="tx1">
+                    <a:lumMod val="75000"/>
+                    <a:lumOff val="25000"/>
+                  </a:schemeClr>
+                </a:solidFill>
+                <a:latin typeface="+mn-lt"/>
+                <a:ea typeface="+mn-ea"/>
+                <a:cs typeface="+mn-cs"/>
+              </a:defRPr>
+            </a:lvl7pPr>
+            <a:lvl8pPr marL="3429000" indent="-228600" algn="l" defTabSz="457200" rtl="0" eaLnBrk="1" latinLnBrk="0" hangingPunct="1">
+              <a:spcBef>
+                <a:spcPts val="1000"/>
+              </a:spcBef>
+              <a:spcAft>
+                <a:spcPts val="0"/>
+              </a:spcAft>
+              <a:buClr>
+                <a:schemeClr val="accent1"/>
+              </a:buClr>
+              <a:buSzPct val="80000"/>
+              <a:buFont typeface="Wingdings 3" charset="2"/>
+              <a:buChar char=""/>
+              <a:defRPr sz="1200" kern="1200">
+                <a:solidFill>
+                  <a:schemeClr val="tx1">
+                    <a:lumMod val="75000"/>
+                    <a:lumOff val="25000"/>
+                  </a:schemeClr>
+                </a:solidFill>
+                <a:latin typeface="+mn-lt"/>
+                <a:ea typeface="+mn-ea"/>
+                <a:cs typeface="+mn-cs"/>
+              </a:defRPr>
+            </a:lvl8pPr>
+            <a:lvl9pPr marL="3886200" indent="-228600" algn="l" defTabSz="457200" rtl="0" eaLnBrk="1" latinLnBrk="0" hangingPunct="1">
+              <a:spcBef>
+                <a:spcPts val="1000"/>
+              </a:spcBef>
+              <a:spcAft>
+                <a:spcPts val="0"/>
+              </a:spcAft>
+              <a:buClr>
+                <a:schemeClr val="accent1"/>
+              </a:buClr>
+              <a:buSzPct val="80000"/>
+              <a:buFont typeface="Wingdings 3" charset="2"/>
+              <a:buChar char=""/>
+              <a:defRPr sz="1200" kern="1200">
+                <a:solidFill>
+                  <a:schemeClr val="tx1">
+                    <a:lumMod val="75000"/>
+                    <a:lumOff val="25000"/>
+                  </a:schemeClr>
+                </a:solidFill>
+                <a:latin typeface="+mn-lt"/>
+                <a:ea typeface="+mn-ea"/>
+                <a:cs typeface="+mn-cs"/>
+              </a:defRPr>
+            </a:lvl9pPr>
+          </a:lstStyle>
+          <a:p>
+            <a:r>
+              <a:rPr lang="hr-HR" dirty="0" smtClean="0"/>
+              <a:t>web-</a:t>
+            </a:r>
+            <a:r>
+              <a:rPr lang="hr-HR" dirty="0" err="1" smtClean="0"/>
+              <a:t>frontend</a:t>
+            </a:r>
+            <a:r>
+              <a:rPr lang="hr-HR" dirty="0" smtClean="0"/>
+              <a:t>:</a:t>
+            </a:r>
+          </a:p>
+          <a:p>
+            <a:pPr lvl="1"/>
+            <a:r>
+              <a:rPr lang="hr-HR" dirty="0" smtClean="0"/>
+              <a:t>HTML, CSS, BOOTSTRAP, </a:t>
+            </a:r>
+            <a:r>
+              <a:rPr lang="hr-HR" dirty="0" err="1" smtClean="0"/>
+              <a:t>javascript</a:t>
+            </a:r>
+            <a:r>
+              <a:rPr lang="hr-HR" dirty="0" smtClean="0"/>
+              <a:t>, </a:t>
+            </a:r>
+            <a:r>
+              <a:rPr lang="hr-HR" dirty="0" err="1" smtClean="0"/>
+              <a:t>jQuery</a:t>
+            </a:r>
+            <a:r>
+              <a:rPr lang="hr-HR" dirty="0" smtClean="0"/>
+              <a:t>, EJS (&lt;% </a:t>
+            </a:r>
+            <a:r>
+              <a:rPr lang="hr-HR" dirty="0" err="1"/>
+              <a:t>Embedded</a:t>
+            </a:r>
+            <a:r>
+              <a:rPr lang="hr-HR" dirty="0"/>
+              <a:t> </a:t>
+            </a:r>
+            <a:r>
+              <a:rPr lang="hr-HR" dirty="0" err="1"/>
+              <a:t>JavaScript</a:t>
+            </a:r>
+            <a:r>
+              <a:rPr lang="hr-HR" dirty="0"/>
+              <a:t> </a:t>
+            </a:r>
+            <a:r>
+              <a:rPr lang="hr-HR" dirty="0" smtClean="0"/>
+              <a:t>%&gt;)</a:t>
+            </a:r>
+            <a:endParaRPr lang="hr-HR" dirty="0"/>
+          </a:p>
+          <a:p>
+            <a:pPr lvl="1"/>
+            <a:r>
+              <a:rPr lang="hr-HR" dirty="0" err="1" smtClean="0"/>
+              <a:t>Brackets</a:t>
+            </a:r>
+            <a:r>
+              <a:rPr lang="hr-HR" dirty="0" smtClean="0"/>
+              <a:t> IDE</a:t>
+            </a:r>
+          </a:p>
+          <a:p>
+            <a:pPr marL="457200" lvl="1" indent="0">
+              <a:buFont typeface="Wingdings 3" charset="2"/>
+              <a:buNone/>
+            </a:pPr>
+            <a:r>
+              <a:rPr lang="hr-HR" dirty="0" smtClean="0"/>
+              <a:t> </a:t>
+            </a:r>
+            <a:endParaRPr lang="hr-HR" dirty="0"/>
+          </a:p>
+        </p:txBody>
+      </p:sp>
+      <p:sp>
+        <p:nvSpPr>
+          <p:cNvPr id="6" name="Content Placeholder 2"/>
+          <p:cNvSpPr txBox="1">
+            <a:spLocks/>
+          </p:cNvSpPr>
+          <p:nvPr/>
+        </p:nvSpPr>
+        <p:spPr>
+          <a:xfrm>
+            <a:off x="677334" y="5099073"/>
+            <a:ext cx="8596668" cy="1592013"/>
           </a:xfrm>
           <a:prstGeom prst="rect">
             <a:avLst/>
@@ -9044,47 +9711,60 @@
           <a:p>
             <a:r>
               <a:rPr lang="hr-HR" dirty="0" smtClean="0"/>
-              <a:t>web-</a:t>
-            </a:r>
+              <a:t>komunikacija sa serverom:</a:t>
+            </a:r>
+          </a:p>
+          <a:p>
+            <a:pPr lvl="1"/>
             <a:r>
               <a:rPr lang="hr-HR" dirty="0" err="1" smtClean="0"/>
-              <a:t>frontend</a:t>
-            </a:r>
-            <a:r>
-              <a:rPr lang="hr-HR" dirty="0" smtClean="0"/>
-              <a:t>:</a:t>
-            </a:r>
+              <a:t>get</a:t>
+            </a:r>
+            <a:r>
+              <a:rPr lang="hr-HR" dirty="0" smtClean="0"/>
+              <a:t> i post zahtjevi i </a:t>
+            </a:r>
+            <a:r>
+              <a:rPr lang="hr-HR" dirty="0" err="1" smtClean="0"/>
+              <a:t>ajax</a:t>
+            </a:r>
+            <a:r>
+              <a:rPr lang="hr-HR" dirty="0" smtClean="0"/>
+              <a:t> zahtjevi prema </a:t>
+            </a:r>
+            <a:r>
+              <a:rPr lang="hr-HR" dirty="0" err="1" smtClean="0"/>
+              <a:t>predefiniranom</a:t>
+            </a:r>
+            <a:r>
+              <a:rPr lang="hr-HR" dirty="0" smtClean="0"/>
+              <a:t> </a:t>
+            </a:r>
+            <a:r>
+              <a:rPr lang="hr-HR" dirty="0" err="1" smtClean="0"/>
+              <a:t>apiju</a:t>
+            </a:r>
+            <a:endParaRPr lang="hr-HR" dirty="0" smtClean="0"/>
           </a:p>
           <a:p>
             <a:pPr lvl="1"/>
             <a:r>
               <a:rPr lang="hr-HR" dirty="0" smtClean="0"/>
-              <a:t>HTML, CSS, BOOTSTRAP, </a:t>
+              <a:t>razmjenjuju se JSON strukture podataka (</a:t>
             </a:r>
             <a:r>
               <a:rPr lang="hr-HR" dirty="0" err="1" smtClean="0"/>
-              <a:t>javascript</a:t>
-            </a:r>
-            <a:r>
-              <a:rPr lang="hr-HR" dirty="0" smtClean="0"/>
-              <a:t>, </a:t>
+              <a:t>ajax</a:t>
+            </a:r>
+            <a:r>
+              <a:rPr lang="hr-HR" dirty="0" smtClean="0"/>
+              <a:t>) ili EJS </a:t>
             </a:r>
             <a:r>
               <a:rPr lang="hr-HR" dirty="0" err="1" smtClean="0"/>
-              <a:t>jQuery</a:t>
+              <a:t>viewovi</a:t>
             </a:r>
             <a:endParaRPr lang="hr-HR" dirty="0" smtClean="0"/>
-          </a:p>
-          <a:p>
-            <a:pPr marL="457200" lvl="1" indent="0">
-              <a:buFont typeface="Wingdings 3" charset="2"/>
-              <a:buNone/>
-            </a:pPr>
-            <a:r>
-              <a:rPr lang="hr-HR" dirty="0" smtClean="0"/>
-              <a:t> </a:t>
-            </a:r>
-            <a:endParaRPr lang="hr-HR" dirty="0"/>
           </a:p>
         </p:txBody>
       </p:sp>
@@ -9098,6 +9778,283 @@
   <p:clrMapOvr>
     <a:masterClrMapping/>
   </p:clrMapOvr>
+  <p:timing>
+    <p:tnLst>
+      <p:par>
+        <p:cTn id="1" dur="indefinite" restart="never" nodeType="tmRoot"/>
+      </p:par>
+    </p:tnLst>
+  </p:timing>
+</p:sld>
+</file>
+
+<file path=ppt/slides/slide25.xml><?xml version="1.0" encoding="utf-8"?>
+<p:sld xmlns:a="http://schemas.openxmlformats.org/drawingml/2006/main" xmlns:r="http://schemas.openxmlformats.org/officeDocument/2006/relationships" xmlns:p="http://schemas.openxmlformats.org/presentationml/2006/main">
+  <p:cSld>
+    <p:spTree>
+      <p:nvGrpSpPr>
+        <p:cNvPr id="1" name=""/>
+        <p:cNvGrpSpPr/>
+        <p:nvPr/>
+      </p:nvGrpSpPr>
+      <p:grpSpPr>
+        <a:xfrm>
+          <a:off x="0" y="0"/>
+          <a:ext cx="0" cy="0"/>
+          <a:chOff x="0" y="0"/>
+          <a:chExt cx="0" cy="0"/>
+        </a:xfrm>
+      </p:grpSpPr>
+      <p:sp>
+        <p:nvSpPr>
+          <p:cNvPr id="2" name="Title 1"/>
+          <p:cNvSpPr>
+            <a:spLocks noGrp="1"/>
+          </p:cNvSpPr>
+          <p:nvPr>
+            <p:ph type="title"/>
+          </p:nvPr>
+        </p:nvSpPr>
+        <p:spPr/>
+        <p:txBody>
+          <a:bodyPr/>
+          <a:lstStyle/>
+          <a:p>
+            <a:pPr algn="ctr"/>
+            <a:r>
+              <a:rPr lang="hr-HR" dirty="0" smtClean="0"/>
+              <a:t>REST API</a:t>
+            </a:r>
+            <a:endParaRPr lang="hr-HR" dirty="0"/>
+          </a:p>
+        </p:txBody>
+      </p:sp>
+      <p:pic>
+        <p:nvPicPr>
+          <p:cNvPr id="4" name="Content Placeholder 3"/>
+          <p:cNvPicPr>
+            <a:picLocks noGrp="1" noChangeAspect="1"/>
+          </p:cNvPicPr>
+          <p:nvPr>
+            <p:ph idx="1"/>
+          </p:nvPr>
+        </p:nvPicPr>
+        <p:blipFill>
+          <a:blip r:embed="rId2" cstate="print">
+            <a:extLst>
+              <a:ext uri="{28A0092B-C50C-407E-A947-70E740481C1C}">
+                <a14:useLocalDpi xmlns:a14="http://schemas.microsoft.com/office/drawing/2010/main" val="0"/>
+              </a:ext>
+            </a:extLst>
+          </a:blip>
+          <a:stretch>
+            <a:fillRect/>
+          </a:stretch>
+        </p:blipFill>
+        <p:spPr>
+          <a:xfrm>
+            <a:off x="1275899" y="1127496"/>
+            <a:ext cx="7891851" cy="8791111"/>
+          </a:xfrm>
+        </p:spPr>
+      </p:pic>
+    </p:spTree>
+    <p:extLst>
+      <p:ext uri="{BB962C8B-B14F-4D97-AF65-F5344CB8AC3E}">
+        <p14:creationId xmlns:p14="http://schemas.microsoft.com/office/powerpoint/2010/main" val="1813099210"/>
+      </p:ext>
+    </p:extLst>
+  </p:cSld>
+  <p:clrMapOvr>
+    <a:masterClrMapping/>
+  </p:clrMapOvr>
+  <p:timing>
+    <p:tnLst>
+      <p:par>
+        <p:cTn id="1" dur="indefinite" restart="never" nodeType="tmRoot"/>
+      </p:par>
+    </p:tnLst>
+  </p:timing>
+</p:sld>
+</file>
+
+<file path=ppt/slides/slide26.xml><?xml version="1.0" encoding="utf-8"?>
+<p:sld xmlns:a="http://schemas.openxmlformats.org/drawingml/2006/main" xmlns:r="http://schemas.openxmlformats.org/officeDocument/2006/relationships" xmlns:p="http://schemas.openxmlformats.org/presentationml/2006/main">
+  <p:cSld>
+    <p:spTree>
+      <p:nvGrpSpPr>
+        <p:cNvPr id="1" name=""/>
+        <p:cNvGrpSpPr/>
+        <p:nvPr/>
+      </p:nvGrpSpPr>
+      <p:grpSpPr>
+        <a:xfrm>
+          <a:off x="0" y="0"/>
+          <a:ext cx="0" cy="0"/>
+          <a:chOff x="0" y="0"/>
+          <a:chExt cx="0" cy="0"/>
+        </a:xfrm>
+      </p:grpSpPr>
+      <p:sp>
+        <p:nvSpPr>
+          <p:cNvPr id="2" name="Title 1"/>
+          <p:cNvSpPr>
+            <a:spLocks noGrp="1"/>
+          </p:cNvSpPr>
+          <p:nvPr>
+            <p:ph type="title"/>
+          </p:nvPr>
+        </p:nvSpPr>
+        <p:spPr/>
+        <p:txBody>
+          <a:bodyPr/>
+          <a:lstStyle/>
+          <a:p>
+            <a:pPr algn="ctr"/>
+            <a:r>
+              <a:rPr lang="hr-HR" dirty="0" smtClean="0"/>
+              <a:t>Model baze podataka</a:t>
+            </a:r>
+            <a:endParaRPr lang="hr-HR" dirty="0"/>
+          </a:p>
+        </p:txBody>
+      </p:sp>
+      <p:pic>
+        <p:nvPicPr>
+          <p:cNvPr id="4" name="Content Placeholder 3"/>
+          <p:cNvPicPr>
+            <a:picLocks noGrp="1" noChangeAspect="1"/>
+          </p:cNvPicPr>
+          <p:nvPr>
+            <p:ph idx="1"/>
+          </p:nvPr>
+        </p:nvPicPr>
+        <p:blipFill>
+          <a:blip r:embed="rId2">
+            <a:extLst>
+              <a:ext uri="{28A0092B-C50C-407E-A947-70E740481C1C}">
+                <a14:useLocalDpi xmlns:a14="http://schemas.microsoft.com/office/drawing/2010/main" val="0"/>
+              </a:ext>
+            </a:extLst>
+          </a:blip>
+          <a:stretch>
+            <a:fillRect/>
+          </a:stretch>
+        </p:blipFill>
+        <p:spPr>
+          <a:xfrm>
+            <a:off x="1116281" y="1258679"/>
+            <a:ext cx="8300851" cy="5599321"/>
+          </a:xfrm>
+        </p:spPr>
+      </p:pic>
+    </p:spTree>
+    <p:extLst>
+      <p:ext uri="{BB962C8B-B14F-4D97-AF65-F5344CB8AC3E}">
+        <p14:creationId xmlns:p14="http://schemas.microsoft.com/office/powerpoint/2010/main" val="1398913091"/>
+      </p:ext>
+    </p:extLst>
+  </p:cSld>
+  <p:clrMapOvr>
+    <a:masterClrMapping/>
+  </p:clrMapOvr>
+  <p:timing>
+    <p:tnLst>
+      <p:par>
+        <p:cTn id="1" dur="indefinite" restart="never" nodeType="tmRoot"/>
+      </p:par>
+    </p:tnLst>
+  </p:timing>
+</p:sld>
+</file>
+
+<file path=ppt/slides/slide27.xml><?xml version="1.0" encoding="utf-8"?>
+<p:sld xmlns:a="http://schemas.openxmlformats.org/drawingml/2006/main" xmlns:r="http://schemas.openxmlformats.org/officeDocument/2006/relationships" xmlns:p="http://schemas.openxmlformats.org/presentationml/2006/main">
+  <p:cSld>
+    <p:spTree>
+      <p:nvGrpSpPr>
+        <p:cNvPr id="1" name=""/>
+        <p:cNvGrpSpPr/>
+        <p:nvPr/>
+      </p:nvGrpSpPr>
+      <p:grpSpPr>
+        <a:xfrm>
+          <a:off x="0" y="0"/>
+          <a:ext cx="0" cy="0"/>
+          <a:chOff x="0" y="0"/>
+          <a:chExt cx="0" cy="0"/>
+        </a:xfrm>
+      </p:grpSpPr>
+      <p:sp>
+        <p:nvSpPr>
+          <p:cNvPr id="2" name="Title 1"/>
+          <p:cNvSpPr>
+            <a:spLocks noGrp="1"/>
+          </p:cNvSpPr>
+          <p:nvPr>
+            <p:ph type="title"/>
+          </p:nvPr>
+        </p:nvSpPr>
+        <p:spPr/>
+        <p:txBody>
+          <a:bodyPr/>
+          <a:lstStyle/>
+          <a:p>
+            <a:pPr algn="ctr"/>
+            <a:r>
+              <a:rPr lang="hr-HR" dirty="0" smtClean="0"/>
+              <a:t>Literatura</a:t>
+            </a:r>
+            <a:endParaRPr lang="hr-HR" dirty="0"/>
+          </a:p>
+        </p:txBody>
+      </p:sp>
+      <p:pic>
+        <p:nvPicPr>
+          <p:cNvPr id="4" name="Content Placeholder 3"/>
+          <p:cNvPicPr>
+            <a:picLocks noGrp="1" noChangeAspect="1"/>
+          </p:cNvPicPr>
+          <p:nvPr>
+            <p:ph idx="1"/>
+          </p:nvPr>
+        </p:nvPicPr>
+        <p:blipFill>
+          <a:blip r:embed="rId2">
+            <a:extLst>
+              <a:ext uri="{28A0092B-C50C-407E-A947-70E740481C1C}">
+                <a14:useLocalDpi xmlns:a14="http://schemas.microsoft.com/office/drawing/2010/main" val="0"/>
+              </a:ext>
+            </a:extLst>
+          </a:blip>
+          <a:stretch>
+            <a:fillRect/>
+          </a:stretch>
+        </p:blipFill>
+        <p:spPr>
+          <a:xfrm>
+            <a:off x="677334" y="2039904"/>
+            <a:ext cx="9314985" cy="4818096"/>
+          </a:xfrm>
+        </p:spPr>
+      </p:pic>
+    </p:spTree>
+    <p:extLst>
+      <p:ext uri="{BB962C8B-B14F-4D97-AF65-F5344CB8AC3E}">
+        <p14:creationId xmlns:p14="http://schemas.microsoft.com/office/powerpoint/2010/main" val="2900801748"/>
+      </p:ext>
+    </p:extLst>
+  </p:cSld>
+  <p:clrMapOvr>
+    <a:masterClrMapping/>
+  </p:clrMapOvr>
+  <p:timing>
+    <p:tnLst>
+      <p:par>
+        <p:cTn id="1" dur="indefinite" restart="never" nodeType="tmRoot"/>
+      </p:par>
+    </p:tnLst>
+  </p:timing>
 </p:sld>
 </file>
 
@@ -9159,7 +10116,11 @@
             </a:r>
             <a:r>
               <a:rPr lang="hr-HR" dirty="0" smtClean="0"/>
-              <a:t>vijesti(post) </a:t>
+              <a:t>vijesti (</a:t>
+            </a:r>
+            <a:r>
+              <a:rPr lang="hr-HR" dirty="0" smtClean="0"/>
+              <a:t>post) </a:t>
             </a:r>
             <a:r>
               <a:rPr lang="hr-HR" dirty="0"/>
@@ -9181,12 +10142,16 @@
               <a:t>slika na </a:t>
             </a:r>
             <a:r>
-              <a:rPr lang="hr-HR" dirty="0" err="1"/>
+              <a:rPr lang="hr-HR" dirty="0" err="1" smtClean="0"/>
               <a:t>gallery</a:t>
             </a:r>
             <a:r>
+              <a:rPr lang="hr-HR" dirty="0" smtClean="0"/>
+              <a:t> (</a:t>
+            </a:r>
+            <a:r>
               <a:rPr lang="hr-HR" dirty="0"/>
-              <a:t>(album fotografija) </a:t>
+              <a:t>album fotografija) </a:t>
             </a:r>
             <a:r>
               <a:rPr lang="hr-HR" dirty="0" smtClean="0"/>
@@ -9201,7 +10166,11 @@
             </a:r>
             <a:r>
               <a:rPr lang="hr-HR" dirty="0"/>
-              <a:t>i brisanje mjehurića(</a:t>
+              <a:t>i brisanje </a:t>
+            </a:r>
+            <a:r>
+              <a:rPr lang="hr-HR" dirty="0" smtClean="0"/>
+              <a:t>mjehurića (</a:t>
             </a:r>
             <a:r>
               <a:rPr lang="hr-HR" dirty="0" err="1"/>
@@ -9217,7 +10186,15 @@
             </a:r>
             <a:r>
               <a:rPr lang="hr-HR" dirty="0"/>
-              <a:t>uz neki opis(npr., putovanje)</a:t>
+              <a:t>uz neki </a:t>
+            </a:r>
+            <a:r>
+              <a:rPr lang="hr-HR" dirty="0" smtClean="0"/>
+              <a:t>opis (</a:t>
+            </a:r>
+            <a:r>
+              <a:rPr lang="hr-HR" dirty="0"/>
+              <a:t>npr., putovanje)</a:t>
             </a:r>
             <a:endParaRPr lang="hr-HR" dirty="0" smtClean="0"/>
           </a:p>
@@ -9232,7 +10209,11 @@
             <a:pPr lvl="1"/>
             <a:r>
               <a:rPr lang="hr-HR" dirty="0" smtClean="0"/>
-              <a:t>stvaranje, raskidanje veza između korisnika(</a:t>
+              <a:t>stvaranje, raskidanje veza između </a:t>
+            </a:r>
+            <a:r>
+              <a:rPr lang="hr-HR" dirty="0" smtClean="0"/>
+              <a:t>korisnika (</a:t>
             </a:r>
             <a:r>
               <a:rPr lang="hr-HR" dirty="0" err="1" smtClean="0"/>
@@ -9278,7 +10259,15 @@
             <a:pPr lvl="1"/>
             <a:r>
               <a:rPr lang="hr-HR" dirty="0" smtClean="0"/>
-              <a:t>komunikacija korisnika preko prozora za komunikaciju(chat)</a:t>
+              <a:t>komunikacija korisnika preko prozora za </a:t>
+            </a:r>
+            <a:r>
+              <a:rPr lang="hr-HR" dirty="0" smtClean="0"/>
+              <a:t>komunikaciju (</a:t>
+            </a:r>
+            <a:r>
+              <a:rPr lang="hr-HR" dirty="0" smtClean="0"/>
+              <a:t>chat)</a:t>
             </a:r>
           </a:p>
           <a:p>
@@ -9390,7 +10379,11 @@
             <a:pPr lvl="1"/>
             <a:r>
               <a:rPr lang="hr-HR" dirty="0" smtClean="0"/>
-              <a:t>podaci računa(</a:t>
+              <a:t>podaci </a:t>
+            </a:r>
+            <a:r>
+              <a:rPr lang="hr-HR" dirty="0" smtClean="0"/>
+              <a:t>računa (</a:t>
             </a:r>
             <a:r>
               <a:rPr lang="hr-HR" dirty="0" err="1" smtClean="0"/>
@@ -9417,7 +10410,11 @@
             </a:r>
             <a:r>
               <a:rPr lang="hr-HR" i="1" dirty="0"/>
-              <a:t>, email, password, password(</a:t>
+              <a:t>, email, password, </a:t>
+            </a:r>
+            <a:r>
+              <a:rPr lang="hr-HR" i="1" dirty="0" smtClean="0"/>
+              <a:t>password (</a:t>
             </a:r>
             <a:r>
               <a:rPr lang="hr-HR" i="1" dirty="0" err="1"/>
@@ -9717,7 +10714,15 @@
             <a:pPr lvl="1"/>
             <a:r>
               <a:rPr lang="hr-HR" dirty="0" smtClean="0"/>
-              <a:t>formati podataka(korisničko ime, email, lozinka)</a:t>
+              <a:t>formati </a:t>
+            </a:r>
+            <a:r>
+              <a:rPr lang="hr-HR" dirty="0" smtClean="0"/>
+              <a:t>podataka (</a:t>
+            </a:r>
+            <a:r>
+              <a:rPr lang="hr-HR" dirty="0" smtClean="0"/>
+              <a:t>korisničko ime, email, lozinka)</a:t>
             </a:r>
           </a:p>
           <a:p>
@@ -10306,16 +11311,28 @@
           <a:p>
             <a:pPr lvl="1"/>
             <a:r>
-              <a:rPr lang="hr-HR" dirty="0" smtClean="0"/>
-              <a:t>korisničko ime(</a:t>
-            </a:r>
-            <a:r>
-              <a:rPr lang="hr-HR" dirty="0" err="1" smtClean="0"/>
+              <a:rPr lang="hr-HR" i="1" dirty="0" smtClean="0"/>
+              <a:t>korisničko </a:t>
+            </a:r>
+            <a:r>
+              <a:rPr lang="hr-HR" i="1" dirty="0" smtClean="0"/>
+              <a:t>ime (</a:t>
+            </a:r>
+            <a:r>
+              <a:rPr lang="hr-HR" i="1" dirty="0" err="1" smtClean="0"/>
               <a:t>username</a:t>
             </a:r>
             <a:r>
-              <a:rPr lang="hr-HR" dirty="0" smtClean="0"/>
-              <a:t>) i password(lozinka)</a:t>
+              <a:rPr lang="hr-HR" i="1" dirty="0" smtClean="0"/>
+              <a:t>) i </a:t>
+            </a:r>
+            <a:r>
+              <a:rPr lang="hr-HR" i="1" dirty="0" smtClean="0"/>
+              <a:t>password (</a:t>
+            </a:r>
+            <a:r>
+              <a:rPr lang="hr-HR" i="1" dirty="0" smtClean="0"/>
+              <a:t>lozinka)</a:t>
             </a:r>
           </a:p>
         </p:txBody>

</xml_diff>